<commit_message>
fixed typos on Slide 19
</commit_message>
<xml_diff>
--- a/tutorial/skeleton-tutorial.pptx
+++ b/tutorial/skeleton-tutorial.pptx
@@ -220,7 +220,7 @@
           <a:p>
             <a:fld id="{8EB09F91-BAE4-9C4E-A794-1F2E5EFBF3C7}" type="datetimeFigureOut">
               <a:rPr lang="en-US" smtClean="0"/>
-              <a:t>9/7/14</a:t>
+              <a:t>9/8/14</a:t>
             </a:fld>
             <a:endParaRPr lang="en-US"/>
           </a:p>
@@ -1089,7 +1089,7 @@
           <a:p>
             <a:fld id="{54EC001A-8909-4547-BB6B-819BDFD345D5}" type="datetimeFigureOut">
               <a:rPr lang="en-US" smtClean="0"/>
-              <a:t>9/7/14</a:t>
+              <a:t>9/8/14</a:t>
             </a:fld>
             <a:endParaRPr lang="en-US"/>
           </a:p>
@@ -1259,7 +1259,7 @@
           <a:p>
             <a:fld id="{54EC001A-8909-4547-BB6B-819BDFD345D5}" type="datetimeFigureOut">
               <a:rPr lang="en-US" smtClean="0"/>
-              <a:t>9/7/14</a:t>
+              <a:t>9/8/14</a:t>
             </a:fld>
             <a:endParaRPr lang="en-US"/>
           </a:p>
@@ -1439,7 +1439,7 @@
           <a:p>
             <a:fld id="{54EC001A-8909-4547-BB6B-819BDFD345D5}" type="datetimeFigureOut">
               <a:rPr lang="en-US" smtClean="0"/>
-              <a:t>9/7/14</a:t>
+              <a:t>9/8/14</a:t>
             </a:fld>
             <a:endParaRPr lang="en-US"/>
           </a:p>
@@ -1609,7 +1609,7 @@
           <a:p>
             <a:fld id="{54EC001A-8909-4547-BB6B-819BDFD345D5}" type="datetimeFigureOut">
               <a:rPr lang="en-US" smtClean="0"/>
-              <a:t>9/7/14</a:t>
+              <a:t>9/8/14</a:t>
             </a:fld>
             <a:endParaRPr lang="en-US"/>
           </a:p>
@@ -1855,7 +1855,7 @@
           <a:p>
             <a:fld id="{54EC001A-8909-4547-BB6B-819BDFD345D5}" type="datetimeFigureOut">
               <a:rPr lang="en-US" smtClean="0"/>
-              <a:t>9/7/14</a:t>
+              <a:t>9/8/14</a:t>
             </a:fld>
             <a:endParaRPr lang="en-US"/>
           </a:p>
@@ -2143,7 +2143,7 @@
           <a:p>
             <a:fld id="{54EC001A-8909-4547-BB6B-819BDFD345D5}" type="datetimeFigureOut">
               <a:rPr lang="en-US" smtClean="0"/>
-              <a:t>9/7/14</a:t>
+              <a:t>9/8/14</a:t>
             </a:fld>
             <a:endParaRPr lang="en-US"/>
           </a:p>
@@ -2565,7 +2565,7 @@
           <a:p>
             <a:fld id="{54EC001A-8909-4547-BB6B-819BDFD345D5}" type="datetimeFigureOut">
               <a:rPr lang="en-US" smtClean="0"/>
-              <a:t>9/7/14</a:t>
+              <a:t>9/8/14</a:t>
             </a:fld>
             <a:endParaRPr lang="en-US"/>
           </a:p>
@@ -2683,7 +2683,7 @@
           <a:p>
             <a:fld id="{54EC001A-8909-4547-BB6B-819BDFD345D5}" type="datetimeFigureOut">
               <a:rPr lang="en-US" smtClean="0"/>
-              <a:t>9/7/14</a:t>
+              <a:t>9/8/14</a:t>
             </a:fld>
             <a:endParaRPr lang="en-US"/>
           </a:p>
@@ -2778,7 +2778,7 @@
           <a:p>
             <a:fld id="{54EC001A-8909-4547-BB6B-819BDFD345D5}" type="datetimeFigureOut">
               <a:rPr lang="en-US" smtClean="0"/>
-              <a:t>9/7/14</a:t>
+              <a:t>9/8/14</a:t>
             </a:fld>
             <a:endParaRPr lang="en-US"/>
           </a:p>
@@ -3055,7 +3055,7 @@
           <a:p>
             <a:fld id="{54EC001A-8909-4547-BB6B-819BDFD345D5}" type="datetimeFigureOut">
               <a:rPr lang="en-US" smtClean="0"/>
-              <a:t>9/7/14</a:t>
+              <a:t>9/8/14</a:t>
             </a:fld>
             <a:endParaRPr lang="en-US"/>
           </a:p>
@@ -3308,7 +3308,7 @@
           <a:p>
             <a:fld id="{54EC001A-8909-4547-BB6B-819BDFD345D5}" type="datetimeFigureOut">
               <a:rPr lang="en-US" smtClean="0"/>
-              <a:t>9/7/14</a:t>
+              <a:t>9/8/14</a:t>
             </a:fld>
             <a:endParaRPr lang="en-US"/>
           </a:p>
@@ -3521,7 +3521,7 @@
           <a:p>
             <a:fld id="{54EC001A-8909-4547-BB6B-819BDFD345D5}" type="datetimeFigureOut">
               <a:rPr lang="en-US" smtClean="0"/>
-              <a:t>9/7/14</a:t>
+              <a:t>9/8/14</a:t>
             </a:fld>
             <a:endParaRPr lang="en-US"/>
           </a:p>
@@ -11635,12 +11635,44 @@
           <a:p>
             <a:pPr algn="ctr"/>
             <a:r>
+              <a:rPr lang="en-US" smtClean="0">
+                <a:solidFill>
+                  <a:srgbClr val="000000"/>
+                </a:solidFill>
+              </a:rPr>
+              <a:t>Stage_1.</a:t>
+            </a:r>
+            <a:r>
               <a:rPr lang="en-US" dirty="0" smtClean="0">
                 <a:solidFill>
                   <a:srgbClr val="000000"/>
                 </a:solidFill>
               </a:rPr>
-              <a:t>Stage_3.Input_1 and Stage_4.Output_1 should have IDENTICAL number of files</a:t>
+              <a:t>Input_1 </a:t>
+            </a:r>
+            <a:r>
+              <a:rPr lang="en-US" smtClean="0">
+                <a:solidFill>
+                  <a:srgbClr val="000000"/>
+                </a:solidFill>
+              </a:rPr>
+              <a:t>and </a:t>
+            </a:r>
+            <a:r>
+              <a:rPr lang="en-US" smtClean="0">
+                <a:solidFill>
+                  <a:srgbClr val="000000"/>
+                </a:solidFill>
+              </a:rPr>
+              <a:t>Stage_1.</a:t>
+            </a:r>
+            <a:r>
+              <a:rPr lang="en-US" dirty="0" smtClean="0">
+                <a:solidFill>
+                  <a:srgbClr val="000000"/>
+                </a:solidFill>
+              </a:rPr>
+              <a:t>Output_1 should have IDENTICAL number of files</a:t>
             </a:r>
             <a:endParaRPr lang="en-US" dirty="0">
               <a:solidFill>
@@ -11754,31 +11786,7 @@
                   <a:srgbClr val="000000"/>
                 </a:solidFill>
               </a:rPr>
-              <a:t>Python2 is </a:t>
-            </a:r>
-            <a:r>
-              <a:rPr lang="en-US" sz="2000" dirty="0" smtClean="0">
-                <a:solidFill>
-                  <a:srgbClr val="000000"/>
-                </a:solidFill>
-              </a:rPr>
-              <a:t>not compatible </a:t>
-            </a:r>
-            <a:r>
-              <a:rPr lang="en-US" sz="2000" dirty="0" smtClean="0">
-                <a:solidFill>
-                  <a:srgbClr val="000000"/>
-                </a:solidFill>
-              </a:rPr>
-              <a:t>with </a:t>
-            </a:r>
-            <a:r>
-              <a:rPr lang="en-US" sz="2000" dirty="0" smtClean="0">
-                <a:solidFill>
-                  <a:srgbClr val="000000"/>
-                </a:solidFill>
-              </a:rPr>
-              <a:t>the external mapper</a:t>
+              <a:t>Python2 is not compatible with the external mapper</a:t>
             </a:r>
             <a:endParaRPr lang="en-US" sz="2000" dirty="0">
               <a:solidFill>
@@ -11809,15 +11817,7 @@
             <a:pPr lvl="1"/>
             <a:r>
               <a:rPr lang="en-US" sz="2000" dirty="0" smtClean="0"/>
-              <a:t>Requires Pegasus to </a:t>
-            </a:r>
-            <a:r>
-              <a:rPr lang="en-US" sz="2000" dirty="0" smtClean="0"/>
-              <a:t>run output Pegasus </a:t>
-            </a:r>
-            <a:r>
-              <a:rPr lang="en-US" sz="2000" dirty="0" smtClean="0"/>
-              <a:t>DAX</a:t>
+              <a:t>Requires Pegasus to run output Pegasus DAX</a:t>
             </a:r>
           </a:p>
           <a:p>

</xml_diff>

<commit_message>
various fixes from first tutorial attempt
</commit_message>
<xml_diff>
--- a/tutorial/skeleton-tutorial.pptx
+++ b/tutorial/skeleton-tutorial.pptx
@@ -7945,7 +7945,7 @@
                   <a:schemeClr val="tx1"/>
                 </a:solidFill>
               </a:rPr>
-              <a:t>10*size^</a:t>
+              <a:t>10*task_length^</a:t>
             </a:r>
             <a:r>
               <a:rPr lang="en-US" dirty="0">
@@ -11635,44 +11635,12 @@
           <a:p>
             <a:pPr algn="ctr"/>
             <a:r>
-              <a:rPr lang="en-US" smtClean="0">
-                <a:solidFill>
-                  <a:srgbClr val="000000"/>
-                </a:solidFill>
-              </a:rPr>
-              <a:t>Stage_1.</a:t>
-            </a:r>
-            <a:r>
               <a:rPr lang="en-US" dirty="0" smtClean="0">
                 <a:solidFill>
                   <a:srgbClr val="000000"/>
                 </a:solidFill>
               </a:rPr>
-              <a:t>Input_1 </a:t>
-            </a:r>
-            <a:r>
-              <a:rPr lang="en-US" smtClean="0">
-                <a:solidFill>
-                  <a:srgbClr val="000000"/>
-                </a:solidFill>
-              </a:rPr>
-              <a:t>and </a:t>
-            </a:r>
-            <a:r>
-              <a:rPr lang="en-US" smtClean="0">
-                <a:solidFill>
-                  <a:srgbClr val="000000"/>
-                </a:solidFill>
-              </a:rPr>
-              <a:t>Stage_1.</a:t>
-            </a:r>
-            <a:r>
-              <a:rPr lang="en-US" dirty="0" smtClean="0">
-                <a:solidFill>
-                  <a:srgbClr val="000000"/>
-                </a:solidFill>
-              </a:rPr>
-              <a:t>Output_1 should have IDENTICAL number of files</a:t>
+              <a:t>Stage_1.Input_1 and Stage_1.Output_1 should have IDENTICAL number of files</a:t>
             </a:r>
             <a:endParaRPr lang="en-US" dirty="0">
               <a:solidFill>
@@ -12892,7 +12860,9 @@
         </p:nvSpPr>
         <p:spPr/>
         <p:txBody>
-          <a:bodyPr/>
+          <a:bodyPr>
+            <a:normAutofit lnSpcReduction="10000"/>
+          </a:bodyPr>
           <a:lstStyle/>
           <a:p>
             <a:r>
@@ -13001,6 +12971,13 @@
               <a:t>bag.png</a:t>
             </a:r>
             <a:endParaRPr lang="en-US" dirty="0"/>
+          </a:p>
+          <a:p>
+            <a:pPr lvl="1"/>
+            <a:r>
+              <a:rPr lang="en-US" dirty="0" smtClean="0"/>
+              <a:t>This is how the images in this presentation have been generated</a:t>
+            </a:r>
           </a:p>
         </p:txBody>
       </p:sp>
@@ -13058,7 +13035,7 @@
           <a:p>
             <a:r>
               <a:rPr lang="en-US" dirty="0" smtClean="0"/>
-              <a:t>Questions?</a:t>
+              <a:t>Conclusion</a:t>
             </a:r>
             <a:endParaRPr lang="en-US" dirty="0"/>
           </a:p>
@@ -13079,7 +13056,25 @@
           <a:bodyPr/>
           <a:lstStyle/>
           <a:p>
-            <a:endParaRPr lang="en-US"/>
+            <a:r>
+              <a:rPr lang="en-US" dirty="0" smtClean="0"/>
+              <a:t>More information in ../report/</a:t>
+            </a:r>
+            <a:r>
+              <a:rPr lang="en-US" dirty="0" err="1" smtClean="0"/>
+              <a:t>report.pdf</a:t>
+            </a:r>
+            <a:endParaRPr lang="en-US" dirty="0" smtClean="0"/>
+          </a:p>
+          <a:p>
+            <a:endParaRPr lang="en-US" dirty="0"/>
+          </a:p>
+          <a:p>
+            <a:r>
+              <a:rPr lang="en-US" dirty="0" smtClean="0"/>
+              <a:t>Questions?</a:t>
+            </a:r>
+            <a:endParaRPr lang="en-US" dirty="0"/>
           </a:p>
         </p:txBody>
       </p:sp>
@@ -13170,21 +13165,12 @@
             </a:r>
             <a:r>
               <a:rPr lang="en-US" sz="2400" dirty="0"/>
-              <a:t>clone </a:t>
-            </a:r>
-            <a:r>
-              <a:rPr lang="en-US" sz="2400" dirty="0">
-                <a:hlinkClick r:id="rId2"/>
-              </a:rPr>
-              <a:t>https://github.com/applicationskeleton/</a:t>
-            </a:r>
-            <a:r>
-              <a:rPr lang="en-US" sz="2400" dirty="0" smtClean="0">
-                <a:hlinkClick r:id="rId2"/>
-              </a:rPr>
+              <a:t>clone https://github.com/applicationskeleton/</a:t>
+            </a:r>
+            <a:r>
+              <a:rPr lang="en-US" sz="2400" dirty="0" smtClean="0"/>
               <a:t>Skeleton.git</a:t>
             </a:r>
-            <a:endParaRPr lang="en-US" sz="2400" dirty="0" smtClean="0"/>
           </a:p>
           <a:p>
             <a:r>
@@ -15134,17 +15120,21 @@
                 <a:latin typeface="American Typewriter"/>
                 <a:cs typeface="American Typewriter"/>
               </a:rPr>
-              <a:t>task serial 1 1.1 65536 65536 1 1 0 Stage_1_Input/Stage_1_Input_0_1 Stage_1_Output/Stage_1_Output_0_1 4200000</a:t>
-            </a:r>
-          </a:p>
-          <a:p>
-            <a:pPr lvl="1"/>
+              <a:t>task serial 1 </a:t>
+            </a:r>
+            <a:r>
+              <a:rPr lang="en-US" sz="1000" dirty="0" smtClean="0">
+                <a:latin typeface="American Typewriter"/>
+                <a:cs typeface="American Typewriter"/>
+              </a:rPr>
+              <a:t>5 </a:t>
+            </a:r>
             <a:r>
               <a:rPr lang="en-US" sz="1000" dirty="0">
                 <a:latin typeface="American Typewriter"/>
                 <a:cs typeface="American Typewriter"/>
               </a:rPr>
-              <a:t>task serial 1 1.1 65536 65536 1 1 0 Stage_1_Input/Stage_1_Input_0_2 Stage_1_Output/Stage_1_Output_0_2 4200000</a:t>
+              <a:t>65536 65536 1 1 0 Stage_1_Input/Stage_1_Input_0_1 Stage_1_Output/Stage_1_Output_0_1 4200000</a:t>
             </a:r>
           </a:p>
           <a:p>
@@ -15154,17 +15144,55 @@
                 <a:latin typeface="American Typewriter"/>
                 <a:cs typeface="American Typewriter"/>
               </a:rPr>
-              <a:t>task serial 1 1.1 65536 65536 1 1 0 Stage_1_Input/Stage_1_Input_0_3 Stage_1_Output/Stage_1_Output_0_3 4200000</a:t>
+              <a:t>task serial 1 </a:t>
+            </a:r>
+            <a:r>
+              <a:rPr lang="en-US" sz="1000" dirty="0" smtClean="0">
+                <a:latin typeface="American Typewriter"/>
+                <a:cs typeface="American Typewriter"/>
+              </a:rPr>
+              <a:t>5 65536 65536 1 1 0 Stage_1_Input/Stage_1_Input_0_2 Stage_1_Output/Stage_1_Output_0_2 4200000</a:t>
             </a:r>
           </a:p>
           <a:p>
             <a:pPr lvl="1"/>
+            <a:r>
+              <a:rPr lang="en-US" sz="1000" dirty="0" smtClean="0">
+                <a:latin typeface="American Typewriter"/>
+                <a:cs typeface="American Typewriter"/>
+              </a:rPr>
+              <a:t>task serial 1 5 65536 65536 1 1 0 Stage_1_Input/Stage_1_Input_0_3 Stage_1_Output/Stage_1_Output_0_3 4200000</a:t>
+            </a:r>
+          </a:p>
+          <a:p>
+            <a:pPr lvl="1"/>
+            <a:r>
+              <a:rPr lang="en-US" sz="1000" dirty="0" smtClean="0">
+                <a:latin typeface="American Typewriter"/>
+                <a:cs typeface="American Typewriter"/>
+              </a:rPr>
+              <a:t>task </a:t>
+            </a:r>
             <a:r>
               <a:rPr lang="en-US" sz="1000" dirty="0">
                 <a:latin typeface="American Typewriter"/>
                 <a:cs typeface="American Typewriter"/>
               </a:rPr>
-              <a:t>task serial 1 1.1 65536 65536 1 1 0 Stage_1_Input/Stage_1_Input_0_4 Stage_1_Output/Stage_1_Output_0_4 </a:t>
+              <a:t>serial 1 </a:t>
+            </a:r>
+            <a:r>
+              <a:rPr lang="en-US" sz="1000" dirty="0" smtClean="0">
+                <a:latin typeface="American Typewriter"/>
+                <a:cs typeface="American Typewriter"/>
+              </a:rPr>
+              <a:t>5 </a:t>
+            </a:r>
+            <a:r>
+              <a:rPr lang="en-US" sz="1000" dirty="0">
+                <a:latin typeface="American Typewriter"/>
+                <a:cs typeface="American Typewriter"/>
+              </a:rPr>
+              <a:t>65536 65536 1 1 0 Stage_1_Input/Stage_1_Input_0_4 Stage_1_Output/Stage_1_Output_0_4 </a:t>
             </a:r>
             <a:r>
               <a:rPr lang="en-US" sz="1000" dirty="0" smtClean="0">
@@ -15377,27 +15405,12 @@
           <a:p>
             <a:pPr marL="742950" lvl="2" indent="-342900"/>
             <a:r>
-              <a:rPr lang="en-US" sz="2000" dirty="0" smtClean="0"/>
-              <a:t>cd </a:t>
-            </a:r>
-            <a:r>
-              <a:rPr lang="en-US" sz="2000" dirty="0" err="1" smtClean="0"/>
-              <a:t>src</a:t>
-            </a:r>
-            <a:r>
-              <a:rPr lang="en-US" sz="2000" dirty="0" smtClean="0"/>
-              <a:t>/</a:t>
-            </a:r>
-          </a:p>
-          <a:p>
-            <a:pPr marL="742950" lvl="2" indent="-342900"/>
-            <a:r>
               <a:rPr lang="en-US" sz="2000" dirty="0" err="1" smtClean="0"/>
               <a:t>gcc</a:t>
             </a:r>
             <a:r>
               <a:rPr lang="en-US" sz="2000" dirty="0" smtClean="0"/>
-              <a:t> –o task </a:t>
+              <a:t> -o task </a:t>
             </a:r>
             <a:r>
               <a:rPr lang="en-US" sz="2000" dirty="0" err="1" smtClean="0"/>
@@ -15405,20 +15418,15 @@
             </a:r>
             <a:r>
               <a:rPr lang="en-US" sz="2000" dirty="0" smtClean="0"/>
-              <a:t> –lm</a:t>
+              <a:t> -lm</a:t>
             </a:r>
           </a:p>
           <a:p>
             <a:pPr marL="742950" lvl="2" indent="-342900"/>
             <a:r>
               <a:rPr lang="en-US" sz="2000" dirty="0" smtClean="0"/>
-              <a:t>export PATH=$PATH:/path-to-Skeleton/</a:t>
-            </a:r>
-            <a:r>
-              <a:rPr lang="en-US" sz="2000" dirty="0" err="1" smtClean="0"/>
-              <a:t>src</a:t>
-            </a:r>
-            <a:endParaRPr lang="en-US" sz="2000" dirty="0" smtClean="0"/>
+              <a:t>export PATH=$PATH:$PWD</a:t>
+            </a:r>
           </a:p>
           <a:p>
             <a:pPr marL="342900" lvl="1" indent="-342900">
@@ -15712,7 +15720,15 @@
             </a:pPr>
             <a:r>
               <a:rPr lang="en-US" sz="2400" dirty="0" smtClean="0"/>
-              <a:t>To Setup:</a:t>
+              <a:t>To </a:t>
+            </a:r>
+            <a:r>
+              <a:rPr lang="en-US" sz="2400" dirty="0"/>
+              <a:t>s</a:t>
+            </a:r>
+            <a:r>
+              <a:rPr lang="en-US" sz="2400" dirty="0" smtClean="0"/>
+              <a:t>etup Swift:</a:t>
             </a:r>
           </a:p>
           <a:p>
@@ -15778,25 +15794,6 @@
               <a:t>tc.data</a:t>
             </a:r>
             <a:endParaRPr lang="en-US" sz="2000" dirty="0" smtClean="0"/>
-          </a:p>
-          <a:p>
-            <a:pPr marL="742950" lvl="2" indent="-342900"/>
-            <a:r>
-              <a:rPr lang="en-US" sz="2000" dirty="0" err="1" smtClean="0"/>
-              <a:t>gcc</a:t>
-            </a:r>
-            <a:r>
-              <a:rPr lang="en-US" sz="2000" dirty="0" smtClean="0"/>
-              <a:t> –o task </a:t>
-            </a:r>
-            <a:r>
-              <a:rPr lang="en-US" sz="2000" dirty="0" err="1" smtClean="0"/>
-              <a:t>task.c</a:t>
-            </a:r>
-            <a:r>
-              <a:rPr lang="en-US" sz="2000" dirty="0" smtClean="0"/>
-              <a:t> -lm</a:t>
-            </a:r>
           </a:p>
           <a:p>
             <a:pPr marL="342900" lvl="1" indent="-342900">
@@ -15807,6 +15804,30 @@
               <a:rPr lang="en-US" sz="2400" dirty="0" smtClean="0"/>
               <a:t>To run:</a:t>
             </a:r>
+          </a:p>
+          <a:p>
+            <a:pPr marL="742950" lvl="2" indent="-342900"/>
+            <a:r>
+              <a:rPr lang="en-US" sz="2000" b="1" dirty="0" err="1"/>
+              <a:t>gcc</a:t>
+            </a:r>
+            <a:r>
+              <a:rPr lang="en-US" sz="2000" b="1" dirty="0"/>
+              <a:t> –o task </a:t>
+            </a:r>
+            <a:r>
+              <a:rPr lang="en-US" sz="2000" b="1" dirty="0" err="1"/>
+              <a:t>task.c</a:t>
+            </a:r>
+            <a:r>
+              <a:rPr lang="en-US" sz="2000" b="1" dirty="0"/>
+              <a:t> </a:t>
+            </a:r>
+            <a:r>
+              <a:rPr lang="en-US" sz="2000" b="1" dirty="0" smtClean="0"/>
+              <a:t>–lm</a:t>
+            </a:r>
+            <a:endParaRPr lang="en-US" sz="2000" b="1" dirty="0"/>
           </a:p>
           <a:p>
             <a:pPr marL="742950" lvl="2" indent="-342900"/>

</xml_diff>

<commit_message>
fix for python3 requirement
</commit_message>
<xml_diff>
--- a/tutorial/skeleton-tutorial.pptx
+++ b/tutorial/skeleton-tutorial.pptx
@@ -220,7 +220,7 @@
           <a:p>
             <a:fld id="{8EB09F91-BAE4-9C4E-A794-1F2E5EFBF3C7}" type="datetimeFigureOut">
               <a:rPr lang="en-US" smtClean="0"/>
-              <a:t>9/8/14</a:t>
+              <a:t>10/3/14</a:t>
             </a:fld>
             <a:endParaRPr lang="en-US"/>
           </a:p>
@@ -1089,7 +1089,7 @@
           <a:p>
             <a:fld id="{54EC001A-8909-4547-BB6B-819BDFD345D5}" type="datetimeFigureOut">
               <a:rPr lang="en-US" smtClean="0"/>
-              <a:t>9/8/14</a:t>
+              <a:t>10/3/14</a:t>
             </a:fld>
             <a:endParaRPr lang="en-US"/>
           </a:p>
@@ -1259,7 +1259,7 @@
           <a:p>
             <a:fld id="{54EC001A-8909-4547-BB6B-819BDFD345D5}" type="datetimeFigureOut">
               <a:rPr lang="en-US" smtClean="0"/>
-              <a:t>9/8/14</a:t>
+              <a:t>10/3/14</a:t>
             </a:fld>
             <a:endParaRPr lang="en-US"/>
           </a:p>
@@ -1439,7 +1439,7 @@
           <a:p>
             <a:fld id="{54EC001A-8909-4547-BB6B-819BDFD345D5}" type="datetimeFigureOut">
               <a:rPr lang="en-US" smtClean="0"/>
-              <a:t>9/8/14</a:t>
+              <a:t>10/3/14</a:t>
             </a:fld>
             <a:endParaRPr lang="en-US"/>
           </a:p>
@@ -1609,7 +1609,7 @@
           <a:p>
             <a:fld id="{54EC001A-8909-4547-BB6B-819BDFD345D5}" type="datetimeFigureOut">
               <a:rPr lang="en-US" smtClean="0"/>
-              <a:t>9/8/14</a:t>
+              <a:t>10/3/14</a:t>
             </a:fld>
             <a:endParaRPr lang="en-US"/>
           </a:p>
@@ -1855,7 +1855,7 @@
           <a:p>
             <a:fld id="{54EC001A-8909-4547-BB6B-819BDFD345D5}" type="datetimeFigureOut">
               <a:rPr lang="en-US" smtClean="0"/>
-              <a:t>9/8/14</a:t>
+              <a:t>10/3/14</a:t>
             </a:fld>
             <a:endParaRPr lang="en-US"/>
           </a:p>
@@ -2143,7 +2143,7 @@
           <a:p>
             <a:fld id="{54EC001A-8909-4547-BB6B-819BDFD345D5}" type="datetimeFigureOut">
               <a:rPr lang="en-US" smtClean="0"/>
-              <a:t>9/8/14</a:t>
+              <a:t>10/3/14</a:t>
             </a:fld>
             <a:endParaRPr lang="en-US"/>
           </a:p>
@@ -2565,7 +2565,7 @@
           <a:p>
             <a:fld id="{54EC001A-8909-4547-BB6B-819BDFD345D5}" type="datetimeFigureOut">
               <a:rPr lang="en-US" smtClean="0"/>
-              <a:t>9/8/14</a:t>
+              <a:t>10/3/14</a:t>
             </a:fld>
             <a:endParaRPr lang="en-US"/>
           </a:p>
@@ -2683,7 +2683,7 @@
           <a:p>
             <a:fld id="{54EC001A-8909-4547-BB6B-819BDFD345D5}" type="datetimeFigureOut">
               <a:rPr lang="en-US" smtClean="0"/>
-              <a:t>9/8/14</a:t>
+              <a:t>10/3/14</a:t>
             </a:fld>
             <a:endParaRPr lang="en-US"/>
           </a:p>
@@ -2778,7 +2778,7 @@
           <a:p>
             <a:fld id="{54EC001A-8909-4547-BB6B-819BDFD345D5}" type="datetimeFigureOut">
               <a:rPr lang="en-US" smtClean="0"/>
-              <a:t>9/8/14</a:t>
+              <a:t>10/3/14</a:t>
             </a:fld>
             <a:endParaRPr lang="en-US"/>
           </a:p>
@@ -3055,7 +3055,7 @@
           <a:p>
             <a:fld id="{54EC001A-8909-4547-BB6B-819BDFD345D5}" type="datetimeFigureOut">
               <a:rPr lang="en-US" smtClean="0"/>
-              <a:t>9/8/14</a:t>
+              <a:t>10/3/14</a:t>
             </a:fld>
             <a:endParaRPr lang="en-US"/>
           </a:p>
@@ -3308,7 +3308,7 @@
           <a:p>
             <a:fld id="{54EC001A-8909-4547-BB6B-819BDFD345D5}" type="datetimeFigureOut">
               <a:rPr lang="en-US" smtClean="0"/>
-              <a:t>9/8/14</a:t>
+              <a:t>10/3/14</a:t>
             </a:fld>
             <a:endParaRPr lang="en-US"/>
           </a:p>
@@ -3521,7 +3521,7 @@
           <a:p>
             <a:fld id="{54EC001A-8909-4547-BB6B-819BDFD345D5}" type="datetimeFigureOut">
               <a:rPr lang="en-US" smtClean="0"/>
-              <a:t>9/8/14</a:t>
+              <a:t>10/3/14</a:t>
             </a:fld>
             <a:endParaRPr lang="en-US"/>
           </a:p>
@@ -10598,6 +10598,75 @@
           </a:p>
         </p:txBody>
       </p:sp>
+      <p:sp>
+        <p:nvSpPr>
+          <p:cNvPr id="5" name="Rectangle 4"/>
+          <p:cNvSpPr/>
+          <p:nvPr/>
+        </p:nvSpPr>
+        <p:spPr>
+          <a:xfrm>
+            <a:off x="1987251" y="6383259"/>
+            <a:ext cx="4903454" cy="451225"/>
+          </a:xfrm>
+          <a:prstGeom prst="rect">
+            <a:avLst/>
+          </a:prstGeom>
+          <a:solidFill>
+            <a:srgbClr val="FF0000"/>
+          </a:solidFill>
+        </p:spPr>
+        <p:style>
+          <a:lnRef idx="1">
+            <a:schemeClr val="accent1"/>
+          </a:lnRef>
+          <a:fillRef idx="3">
+            <a:schemeClr val="accent1"/>
+          </a:fillRef>
+          <a:effectRef idx="2">
+            <a:schemeClr val="accent1"/>
+          </a:effectRef>
+          <a:fontRef idx="minor">
+            <a:schemeClr val="lt1"/>
+          </a:fontRef>
+        </p:style>
+        <p:txBody>
+          <a:bodyPr rtlCol="0" anchor="ctr"/>
+          <a:lstStyle/>
+          <a:p>
+            <a:pPr algn="ctr"/>
+            <a:r>
+              <a:rPr lang="en-US" dirty="0" smtClean="0">
+                <a:solidFill>
+                  <a:srgbClr val="000000"/>
+                </a:solidFill>
+              </a:rPr>
+              <a:t>Note: </a:t>
+            </a:r>
+            <a:r>
+              <a:rPr lang="en-US" dirty="0" smtClean="0">
+                <a:solidFill>
+                  <a:srgbClr val="000000"/>
+                </a:solidFill>
+              </a:rPr>
+              <a:t>combination mapper </a:t>
+            </a:r>
+            <a:r>
+              <a:rPr lang="en-US" dirty="0" smtClean="0">
+                <a:solidFill>
+                  <a:srgbClr val="000000"/>
+                </a:solidFill>
+              </a:rPr>
+              <a:t>requires Python3</a:t>
+            </a:r>
+            <a:endParaRPr lang="en-US" dirty="0">
+              <a:solidFill>
+                <a:srgbClr val="000000"/>
+              </a:solidFill>
+            </a:endParaRPr>
+          </a:p>
+        </p:txBody>
+      </p:sp>
     </p:spTree>
     <p:extLst>
       <p:ext uri="{BB962C8B-B14F-4D97-AF65-F5344CB8AC3E}">
@@ -11723,7 +11792,7 @@
         <p:spPr/>
         <p:txBody>
           <a:bodyPr>
-            <a:normAutofit/>
+            <a:normAutofit lnSpcReduction="10000"/>
           </a:bodyPr>
           <a:lstStyle/>
           <a:p>
@@ -11754,7 +11823,15 @@
                   <a:srgbClr val="000000"/>
                 </a:solidFill>
               </a:rPr>
-              <a:t>Python2 is not compatible with the external mapper</a:t>
+              <a:t>Python2 is not compatible with the external </a:t>
+            </a:r>
+            <a:r>
+              <a:rPr lang="en-US" sz="2000" dirty="0" smtClean="0">
+                <a:solidFill>
+                  <a:srgbClr val="000000"/>
+                </a:solidFill>
+              </a:rPr>
+              <a:t>or combinatorial mapper options </a:t>
             </a:r>
             <a:endParaRPr lang="en-US" sz="2000" dirty="0">
               <a:solidFill>
@@ -11828,7 +11905,7 @@
               <a:t> - http://</a:t>
             </a:r>
             <a:r>
-              <a:rPr lang="en-US" sz="2000" smtClean="0"/>
+              <a:rPr lang="en-US" sz="2000" dirty="0" err="1" smtClean="0"/>
               <a:t>www.graphviz.org</a:t>
             </a:r>
             <a:endParaRPr lang="en-US" sz="2000" dirty="0" smtClean="0"/>

</xml_diff>

<commit_message>
updating for current branch - changes in command line interface and paths, mostly
</commit_message>
<xml_diff>
--- a/tutorial/skeleton-tutorial.pptx
+++ b/tutorial/skeleton-tutorial.pptx
@@ -220,7 +220,7 @@
           <a:p>
             <a:fld id="{8EB09F91-BAE4-9C4E-A794-1F2E5EFBF3C7}" type="datetimeFigureOut">
               <a:rPr lang="en-US" smtClean="0"/>
-              <a:t>10/3/14</a:t>
+              <a:t>12/15/14</a:t>
             </a:fld>
             <a:endParaRPr lang="en-US"/>
           </a:p>
@@ -1089,7 +1089,7 @@
           <a:p>
             <a:fld id="{54EC001A-8909-4547-BB6B-819BDFD345D5}" type="datetimeFigureOut">
               <a:rPr lang="en-US" smtClean="0"/>
-              <a:t>10/3/14</a:t>
+              <a:t>12/15/14</a:t>
             </a:fld>
             <a:endParaRPr lang="en-US"/>
           </a:p>
@@ -1259,7 +1259,7 @@
           <a:p>
             <a:fld id="{54EC001A-8909-4547-BB6B-819BDFD345D5}" type="datetimeFigureOut">
               <a:rPr lang="en-US" smtClean="0"/>
-              <a:t>10/3/14</a:t>
+              <a:t>12/15/14</a:t>
             </a:fld>
             <a:endParaRPr lang="en-US"/>
           </a:p>
@@ -1439,7 +1439,7 @@
           <a:p>
             <a:fld id="{54EC001A-8909-4547-BB6B-819BDFD345D5}" type="datetimeFigureOut">
               <a:rPr lang="en-US" smtClean="0"/>
-              <a:t>10/3/14</a:t>
+              <a:t>12/15/14</a:t>
             </a:fld>
             <a:endParaRPr lang="en-US"/>
           </a:p>
@@ -1609,7 +1609,7 @@
           <a:p>
             <a:fld id="{54EC001A-8909-4547-BB6B-819BDFD345D5}" type="datetimeFigureOut">
               <a:rPr lang="en-US" smtClean="0"/>
-              <a:t>10/3/14</a:t>
+              <a:t>12/15/14</a:t>
             </a:fld>
             <a:endParaRPr lang="en-US"/>
           </a:p>
@@ -1855,7 +1855,7 @@
           <a:p>
             <a:fld id="{54EC001A-8909-4547-BB6B-819BDFD345D5}" type="datetimeFigureOut">
               <a:rPr lang="en-US" smtClean="0"/>
-              <a:t>10/3/14</a:t>
+              <a:t>12/15/14</a:t>
             </a:fld>
             <a:endParaRPr lang="en-US"/>
           </a:p>
@@ -2143,7 +2143,7 @@
           <a:p>
             <a:fld id="{54EC001A-8909-4547-BB6B-819BDFD345D5}" type="datetimeFigureOut">
               <a:rPr lang="en-US" smtClean="0"/>
-              <a:t>10/3/14</a:t>
+              <a:t>12/15/14</a:t>
             </a:fld>
             <a:endParaRPr lang="en-US"/>
           </a:p>
@@ -2565,7 +2565,7 @@
           <a:p>
             <a:fld id="{54EC001A-8909-4547-BB6B-819BDFD345D5}" type="datetimeFigureOut">
               <a:rPr lang="en-US" smtClean="0"/>
-              <a:t>10/3/14</a:t>
+              <a:t>12/15/14</a:t>
             </a:fld>
             <a:endParaRPr lang="en-US"/>
           </a:p>
@@ -2683,7 +2683,7 @@
           <a:p>
             <a:fld id="{54EC001A-8909-4547-BB6B-819BDFD345D5}" type="datetimeFigureOut">
               <a:rPr lang="en-US" smtClean="0"/>
-              <a:t>10/3/14</a:t>
+              <a:t>12/15/14</a:t>
             </a:fld>
             <a:endParaRPr lang="en-US"/>
           </a:p>
@@ -2778,7 +2778,7 @@
           <a:p>
             <a:fld id="{54EC001A-8909-4547-BB6B-819BDFD345D5}" type="datetimeFigureOut">
               <a:rPr lang="en-US" smtClean="0"/>
-              <a:t>10/3/14</a:t>
+              <a:t>12/15/14</a:t>
             </a:fld>
             <a:endParaRPr lang="en-US"/>
           </a:p>
@@ -3055,7 +3055,7 @@
           <a:p>
             <a:fld id="{54EC001A-8909-4547-BB6B-819BDFD345D5}" type="datetimeFigureOut">
               <a:rPr lang="en-US" smtClean="0"/>
-              <a:t>10/3/14</a:t>
+              <a:t>12/15/14</a:t>
             </a:fld>
             <a:endParaRPr lang="en-US"/>
           </a:p>
@@ -3308,7 +3308,7 @@
           <a:p>
             <a:fld id="{54EC001A-8909-4547-BB6B-819BDFD345D5}" type="datetimeFigureOut">
               <a:rPr lang="en-US" smtClean="0"/>
-              <a:t>10/3/14</a:t>
+              <a:t>12/15/14</a:t>
             </a:fld>
             <a:endParaRPr lang="en-US"/>
           </a:p>
@@ -3521,7 +3521,7 @@
           <a:p>
             <a:fld id="{54EC001A-8909-4547-BB6B-819BDFD345D5}" type="datetimeFigureOut">
               <a:rPr lang="en-US" smtClean="0"/>
-              <a:t>10/3/14</a:t>
+              <a:t>12/15/14</a:t>
             </a:fld>
             <a:endParaRPr lang="en-US"/>
           </a:p>
@@ -3942,8 +3942,19 @@
           <a:p>
             <a:r>
               <a:rPr lang="en-US" dirty="0" smtClean="0"/>
-              <a:t>Daniel S. Katz</a:t>
-            </a:r>
+              <a:t>Daniel S. </a:t>
+            </a:r>
+            <a:r>
+              <a:rPr lang="en-US" dirty="0" smtClean="0"/>
+              <a:t>Katz</a:t>
+            </a:r>
+          </a:p>
+          <a:p>
+            <a:r>
+              <a:rPr lang="en-US" dirty="0" smtClean="0"/>
+              <a:t>Michael Wilde</a:t>
+            </a:r>
+            <a:endParaRPr lang="en-US" dirty="0" smtClean="0"/>
           </a:p>
         </p:txBody>
       </p:sp>
@@ -9617,8 +9628,8 @@
         </p:nvSpPr>
         <p:spPr>
           <a:xfrm>
-            <a:off x="457200" y="6185688"/>
-            <a:ext cx="8341647" cy="338554"/>
+            <a:off x="293340" y="6308583"/>
+            <a:ext cx="8655835" cy="338554"/>
           </a:xfrm>
           <a:prstGeom prst="rect">
             <a:avLst/>
@@ -9649,7 +9660,7 @@
             </a:r>
             <a:r>
               <a:rPr lang="en-US" sz="1600" dirty="0"/>
-              <a:t>/Skeleton/blob/master/</a:t>
+              <a:t>/Skeleton/</a:t>
             </a:r>
             <a:r>
               <a:rPr lang="en-US" sz="1600" dirty="0" err="1"/>
@@ -9657,11 +9668,19 @@
             </a:r>
             <a:r>
               <a:rPr lang="en-US" sz="1600" dirty="0"/>
-              <a:t>/sample-input</a:t>
+              <a:t>/</a:t>
+            </a:r>
+            <a:r>
+              <a:rPr lang="en-US" sz="1600" dirty="0" err="1"/>
+              <a:t>aimes</a:t>
+            </a:r>
+            <a:r>
+              <a:rPr lang="en-US" sz="1600" dirty="0"/>
+              <a:t>/skeleton/sample-input/multi</a:t>
             </a:r>
             <a:r>
               <a:rPr lang="en-US" sz="1600" dirty="0" smtClean="0"/>
-              <a:t>/multi-</a:t>
+              <a:t>-</a:t>
             </a:r>
             <a:r>
               <a:rPr lang="en-US" sz="1600" dirty="0" err="1" smtClean="0"/>
@@ -10545,7 +10564,7 @@
         <p:spPr>
           <a:xfrm>
             <a:off x="202677" y="6016411"/>
-            <a:ext cx="8341647" cy="338554"/>
+            <a:ext cx="8655835" cy="338554"/>
           </a:xfrm>
           <a:prstGeom prst="rect">
             <a:avLst/>
@@ -10576,7 +10595,7 @@
             </a:r>
             <a:r>
               <a:rPr lang="en-US" sz="1600" dirty="0"/>
-              <a:t>/Skeleton/blob/master/</a:t>
+              <a:t>/Skeleton/</a:t>
             </a:r>
             <a:r>
               <a:rPr lang="en-US" sz="1600" dirty="0" err="1"/>
@@ -10584,86 +10603,25 @@
             </a:r>
             <a:r>
               <a:rPr lang="en-US" sz="1600" dirty="0"/>
-              <a:t>/sample-input</a:t>
+              <a:t>/</a:t>
+            </a:r>
+            <a:r>
+              <a:rPr lang="en-US" sz="1600" dirty="0" err="1"/>
+              <a:t>aimes</a:t>
+            </a:r>
+            <a:r>
+              <a:rPr lang="en-US" sz="1600" dirty="0"/>
+              <a:t>/skeleton/sample-input/multi</a:t>
             </a:r>
             <a:r>
               <a:rPr lang="en-US" sz="1600" dirty="0" smtClean="0"/>
-              <a:t>/multi-</a:t>
+              <a:t>-</a:t>
             </a:r>
             <a:r>
               <a:rPr lang="en-US" sz="1600" dirty="0" err="1" smtClean="0"/>
               <a:t>stage.input</a:t>
             </a:r>
             <a:endParaRPr lang="en-US" sz="1600" dirty="0"/>
-          </a:p>
-        </p:txBody>
-      </p:sp>
-      <p:sp>
-        <p:nvSpPr>
-          <p:cNvPr id="5" name="Rectangle 4"/>
-          <p:cNvSpPr/>
-          <p:nvPr/>
-        </p:nvSpPr>
-        <p:spPr>
-          <a:xfrm>
-            <a:off x="1987251" y="6383259"/>
-            <a:ext cx="4903454" cy="451225"/>
-          </a:xfrm>
-          <a:prstGeom prst="rect">
-            <a:avLst/>
-          </a:prstGeom>
-          <a:solidFill>
-            <a:srgbClr val="FF0000"/>
-          </a:solidFill>
-        </p:spPr>
-        <p:style>
-          <a:lnRef idx="1">
-            <a:schemeClr val="accent1"/>
-          </a:lnRef>
-          <a:fillRef idx="3">
-            <a:schemeClr val="accent1"/>
-          </a:fillRef>
-          <a:effectRef idx="2">
-            <a:schemeClr val="accent1"/>
-          </a:effectRef>
-          <a:fontRef idx="minor">
-            <a:schemeClr val="lt1"/>
-          </a:fontRef>
-        </p:style>
-        <p:txBody>
-          <a:bodyPr rtlCol="0" anchor="ctr"/>
-          <a:lstStyle/>
-          <a:p>
-            <a:pPr algn="ctr"/>
-            <a:r>
-              <a:rPr lang="en-US" dirty="0" smtClean="0">
-                <a:solidFill>
-                  <a:srgbClr val="000000"/>
-                </a:solidFill>
-              </a:rPr>
-              <a:t>Note: </a:t>
-            </a:r>
-            <a:r>
-              <a:rPr lang="en-US" dirty="0" smtClean="0">
-                <a:solidFill>
-                  <a:srgbClr val="000000"/>
-                </a:solidFill>
-              </a:rPr>
-              <a:t>combination mapper </a:t>
-            </a:r>
-            <a:r>
-              <a:rPr lang="en-US" dirty="0" smtClean="0">
-                <a:solidFill>
-                  <a:srgbClr val="000000"/>
-                </a:solidFill>
-              </a:rPr>
-              <a:t>requires Python3</a:t>
-            </a:r>
-            <a:endParaRPr lang="en-US" dirty="0">
-              <a:solidFill>
-                <a:srgbClr val="000000"/>
-              </a:solidFill>
-            </a:endParaRPr>
           </a:p>
         </p:txBody>
       </p:sp>
@@ -10890,8 +10848,8 @@
         </p:nvSpPr>
         <p:spPr>
           <a:xfrm>
-            <a:off x="202677" y="6016411"/>
-            <a:ext cx="8869235" cy="338554"/>
+            <a:off x="38817" y="6016411"/>
+            <a:ext cx="9114695" cy="338554"/>
           </a:xfrm>
           <a:prstGeom prst="rect">
             <a:avLst/>
@@ -10922,7 +10880,7 @@
             </a:r>
             <a:r>
               <a:rPr lang="en-US" sz="1600" dirty="0"/>
-              <a:t>/Skeleton/blob/master/</a:t>
+              <a:t>/Skeleton/</a:t>
             </a:r>
             <a:r>
               <a:rPr lang="en-US" sz="1600" dirty="0" err="1"/>
@@ -10930,7 +10888,19 @@
             </a:r>
             <a:r>
               <a:rPr lang="en-US" sz="1600" dirty="0"/>
-              <a:t>/sample-input/external-</a:t>
+              <a:t>/</a:t>
+            </a:r>
+            <a:r>
+              <a:rPr lang="en-US" sz="1600" dirty="0" err="1"/>
+              <a:t>aimes</a:t>
+            </a:r>
+            <a:r>
+              <a:rPr lang="en-US" sz="1600" dirty="0"/>
+              <a:t>/skeleton/sample-input/external</a:t>
+            </a:r>
+            <a:r>
+              <a:rPr lang="en-US" sz="1600" dirty="0"/>
+              <a:t>-</a:t>
             </a:r>
             <a:r>
               <a:rPr lang="en-US" sz="1600" dirty="0" err="1"/>
@@ -10983,7 +10953,31 @@
                   <a:srgbClr val="000000"/>
                 </a:solidFill>
               </a:rPr>
-              <a:t>Note: external mapper requires Python3</a:t>
+              <a:t>Note: external </a:t>
+            </a:r>
+            <a:r>
+              <a:rPr lang="en-US" smtClean="0">
+                <a:solidFill>
+                  <a:srgbClr val="000000"/>
+                </a:solidFill>
+              </a:rPr>
+              <a:t>mapper </a:t>
+            </a:r>
+            <a:r>
+              <a:rPr lang="en-US" smtClean="0">
+                <a:solidFill>
+                  <a:srgbClr val="000000"/>
+                </a:solidFill>
+              </a:rPr>
+              <a:t>may require </a:t>
+            </a:r>
+            <a:r>
+              <a:rPr lang="en-US" dirty="0" smtClean="0">
+                <a:solidFill>
+                  <a:srgbClr val="000000"/>
+                </a:solidFill>
+              </a:rPr>
+              <a:t>Python3</a:t>
             </a:r>
             <a:endParaRPr lang="en-US" dirty="0">
               <a:solidFill>
@@ -11641,7 +11635,7 @@
             </a:r>
             <a:r>
               <a:rPr lang="en-US" sz="1400" dirty="0"/>
-              <a:t>/Skeleton/blob/master/</a:t>
+              <a:t>/Skeleton/</a:t>
             </a:r>
             <a:r>
               <a:rPr lang="en-US" sz="1400" dirty="0" err="1"/>
@@ -11649,7 +11643,19 @@
             </a:r>
             <a:r>
               <a:rPr lang="en-US" sz="1400" dirty="0"/>
-              <a:t>/sample-input/single-stage-</a:t>
+              <a:t>/</a:t>
+            </a:r>
+            <a:r>
+              <a:rPr lang="en-US" sz="1400" dirty="0" err="1"/>
+              <a:t>aimes</a:t>
+            </a:r>
+            <a:r>
+              <a:rPr lang="en-US" sz="1400" dirty="0"/>
+              <a:t>/skeleton/sample-input/single</a:t>
+            </a:r>
+            <a:r>
+              <a:rPr lang="en-US" sz="1400" dirty="0"/>
+              <a:t>-stage-</a:t>
             </a:r>
             <a:r>
               <a:rPr lang="en-US" sz="1400" dirty="0" err="1"/>
@@ -11792,57 +11798,28 @@
         <p:spPr/>
         <p:txBody>
           <a:bodyPr>
-            <a:normAutofit lnSpcReduction="10000"/>
+            <a:normAutofit/>
           </a:bodyPr>
           <a:lstStyle/>
           <a:p>
             <a:r>
               <a:rPr lang="en-US" sz="2400" dirty="0" smtClean="0"/>
-              <a:t>Tested on Mac or Linux</a:t>
-            </a:r>
-          </a:p>
-          <a:p>
+              <a:t>Tested on </a:t>
+            </a:r>
             <a:r>
               <a:rPr lang="en-US" sz="2400" dirty="0" smtClean="0"/>
-              <a:t>By default, uses Python3 (but can fall back to Python2, if first line in </a:t>
-            </a:r>
-            <a:r>
-              <a:rPr lang="en-US" sz="2400" dirty="0" err="1" smtClean="0"/>
-              <a:t>skeleton.py</a:t>
-            </a:r>
+              <a:t>Mac</a:t>
+            </a:r>
+            <a:endParaRPr lang="en-US" sz="2400" dirty="0" smtClean="0"/>
+          </a:p>
+          <a:p>
             <a:r>
               <a:rPr lang="en-US" sz="2400" dirty="0" smtClean="0"/>
-              <a:t> is changed)</a:t>
-            </a:r>
-          </a:p>
-          <a:p>
-            <a:pPr lvl="1"/>
-            <a:r>
-              <a:rPr lang="en-US" sz="2000" dirty="0" smtClean="0">
-                <a:solidFill>
-                  <a:srgbClr val="000000"/>
-                </a:solidFill>
-              </a:rPr>
-              <a:t>Python2 is not compatible with the external </a:t>
-            </a:r>
-            <a:r>
-              <a:rPr lang="en-US" sz="2000" dirty="0" smtClean="0">
-                <a:solidFill>
-                  <a:srgbClr val="000000"/>
-                </a:solidFill>
-              </a:rPr>
-              <a:t>or combinatorial mapper options </a:t>
-            </a:r>
-            <a:endParaRPr lang="en-US" sz="2000" dirty="0">
-              <a:solidFill>
-                <a:srgbClr val="000000"/>
-              </a:solidFill>
-            </a:endParaRPr>
-          </a:p>
-          <a:p>
+              <a:t>Swift</a:t>
+            </a:r>
             <a:r>
               <a:rPr lang="en-US" sz="2400" dirty="0" smtClean="0"/>
-              <a:t>Swift:</a:t>
+              <a:t>:</a:t>
             </a:r>
           </a:p>
           <a:p>
@@ -12035,7 +12012,7 @@
             </a:r>
             <a:r>
               <a:rPr lang="en-US" sz="1400" dirty="0"/>
-              <a:t>/Skeleton/blob/master/</a:t>
+              <a:t>/Skeleton/</a:t>
             </a:r>
             <a:r>
               <a:rPr lang="en-US" sz="1400" dirty="0" err="1"/>
@@ -12043,11 +12020,19 @@
             </a:r>
             <a:r>
               <a:rPr lang="en-US" sz="1400" dirty="0"/>
-              <a:t>/sample-input</a:t>
+              <a:t>/</a:t>
+            </a:r>
+            <a:r>
+              <a:rPr lang="en-US" sz="1400" dirty="0" err="1"/>
+              <a:t>aimes</a:t>
+            </a:r>
+            <a:r>
+              <a:rPr lang="en-US" sz="1400" dirty="0"/>
+              <a:t>/skeleton/sample-input/multiple</a:t>
             </a:r>
             <a:r>
               <a:rPr lang="en-US" sz="1400" dirty="0" smtClean="0"/>
-              <a:t>/multiple-</a:t>
+              <a:t>-</a:t>
             </a:r>
             <a:r>
               <a:rPr lang="en-US" sz="1400" dirty="0"/>
@@ -13135,7 +13120,15 @@
           <a:p>
             <a:r>
               <a:rPr lang="en-US" dirty="0" smtClean="0"/>
-              <a:t>More information in ../report/</a:t>
+              <a:t>More information in </a:t>
+            </a:r>
+            <a:r>
+              <a:rPr lang="en-US" dirty="0" smtClean="0"/>
+              <a:t>report</a:t>
+            </a:r>
+            <a:r>
+              <a:rPr lang="en-US" dirty="0" smtClean="0"/>
+              <a:t>/</a:t>
             </a:r>
             <a:r>
               <a:rPr lang="en-US" dirty="0" err="1" smtClean="0"/>
@@ -13252,121 +13245,165 @@
           <a:p>
             <a:r>
               <a:rPr lang="en-US" sz="2400" dirty="0" smtClean="0"/>
-              <a:t>cd Skeleton/</a:t>
+              <a:t>cd </a:t>
+            </a:r>
+            <a:r>
+              <a:rPr lang="en-US" sz="2400" dirty="0" smtClean="0"/>
+              <a:t>Skeleton</a:t>
+            </a:r>
+            <a:endParaRPr lang="en-US" sz="2400" dirty="0"/>
+          </a:p>
+          <a:p>
+            <a:r>
+              <a:rPr lang="en-US" sz="2400" dirty="0"/>
+              <a:t>python </a:t>
+            </a:r>
+            <a:r>
+              <a:rPr lang="en-US" sz="2400" dirty="0" err="1"/>
+              <a:t>setup.py</a:t>
+            </a:r>
+            <a:r>
+              <a:rPr lang="en-US" sz="2400" dirty="0"/>
+              <a:t> </a:t>
+            </a:r>
+            <a:r>
+              <a:rPr lang="en-US" sz="2400" dirty="0" smtClean="0"/>
+              <a:t>build</a:t>
+            </a:r>
+          </a:p>
+          <a:p>
+            <a:r>
+              <a:rPr lang="en-US" sz="2400" dirty="0"/>
+              <a:t>export PYTHONPATH</a:t>
+            </a:r>
+            <a:r>
+              <a:rPr lang="en-US" sz="2400" dirty="0" smtClean="0"/>
+              <a:t>=</a:t>
             </a:r>
             <a:r>
               <a:rPr lang="en-US" sz="2400" dirty="0" err="1" smtClean="0"/>
-              <a:t>src</a:t>
+              <a:t>Path_to_Skeleton</a:t>
+            </a:r>
+            <a:r>
+              <a:rPr lang="en-US" sz="2400" dirty="0"/>
+              <a:t>/build/lib/</a:t>
             </a:r>
             <a:endParaRPr lang="en-US" sz="2400" dirty="0" smtClean="0"/>
           </a:p>
           <a:p>
+            <a:r>
+              <a:rPr lang="en-US" sz="2400" dirty="0" smtClean="0"/>
+              <a:t>Test </a:t>
+            </a:r>
+            <a:r>
+              <a:rPr lang="en-US" sz="2400" dirty="0" smtClean="0"/>
+              <a:t>case:</a:t>
+            </a:r>
+          </a:p>
+          <a:p>
             <a:pPr lvl="1"/>
             <a:r>
-              <a:rPr lang="en-US" sz="2000" dirty="0" smtClean="0"/>
-              <a:t>If using python2, change first line of </a:t>
-            </a:r>
-            <a:r>
-              <a:rPr lang="en-US" sz="2000" dirty="0" err="1" smtClean="0"/>
-              <a:t>skeleton.py</a:t>
-            </a:r>
-            <a:r>
-              <a:rPr lang="en-US" sz="2000" dirty="0" smtClean="0"/>
-              <a:t> to</a:t>
-            </a:r>
-          </a:p>
-          <a:p>
-            <a:pPr lvl="2"/>
-            <a:r>
-              <a:rPr lang="en-US" sz="1600" dirty="0">
+              <a:rPr lang="en-US" sz="2000" b="1" dirty="0">
                 <a:latin typeface="American Typewriter"/>
                 <a:cs typeface="American Typewriter"/>
               </a:rPr>
-              <a:t>#!/</a:t>
-            </a:r>
-            <a:r>
-              <a:rPr lang="en-US" sz="1600" dirty="0" err="1">
+              <a:t>b</a:t>
+            </a:r>
+            <a:r>
+              <a:rPr lang="en-US" sz="2000" b="1" dirty="0" smtClean="0">
                 <a:latin typeface="American Typewriter"/>
                 <a:cs typeface="American Typewriter"/>
               </a:rPr>
-              <a:t>usr</a:t>
-            </a:r>
-            <a:r>
-              <a:rPr lang="en-US" sz="1600" dirty="0">
+              <a:t>in/</a:t>
+            </a:r>
+            <a:r>
+              <a:rPr lang="en-US" sz="2000" b="1" dirty="0" err="1" smtClean="0">
                 <a:latin typeface="American Typewriter"/>
                 <a:cs typeface="American Typewriter"/>
               </a:rPr>
-              <a:t>/bin/</a:t>
-            </a:r>
-            <a:r>
-              <a:rPr lang="en-US" sz="1600" dirty="0" err="1">
+              <a:t>aimes</a:t>
+            </a:r>
+            <a:r>
+              <a:rPr lang="en-US" sz="2000" b="1" dirty="0" smtClean="0">
                 <a:latin typeface="American Typewriter"/>
                 <a:cs typeface="American Typewriter"/>
               </a:rPr>
-              <a:t>env</a:t>
-            </a:r>
-            <a:r>
-              <a:rPr lang="en-US" sz="1600" dirty="0">
+              <a:t>-skeleton-generate –</a:t>
+            </a:r>
+            <a:r>
+              <a:rPr lang="en-US" sz="2000" b="1" dirty="0" err="1" smtClean="0">
                 <a:latin typeface="American Typewriter"/>
                 <a:cs typeface="American Typewriter"/>
               </a:rPr>
-              <a:t> python</a:t>
-            </a:r>
-            <a:endParaRPr lang="en-US" sz="1600" dirty="0" smtClean="0">
+              <a:t>i</a:t>
+            </a:r>
+            <a:r>
+              <a:rPr lang="en-US" sz="2000" b="1" dirty="0">
+                <a:latin typeface="American Typewriter"/>
+                <a:cs typeface="American Typewriter"/>
+              </a:rPr>
+              <a:t> </a:t>
+            </a:r>
+            <a:r>
+              <a:rPr lang="en-US" sz="2000" b="1" dirty="0" err="1">
+                <a:latin typeface="American Typewriter"/>
+                <a:cs typeface="American Typewriter"/>
+              </a:rPr>
+              <a:t>src</a:t>
+            </a:r>
+            <a:r>
+              <a:rPr lang="en-US" sz="2000" b="1" dirty="0">
+                <a:latin typeface="American Typewriter"/>
+                <a:cs typeface="American Typewriter"/>
+              </a:rPr>
+              <a:t>/</a:t>
+            </a:r>
+            <a:r>
+              <a:rPr lang="en-US" sz="2000" b="1" dirty="0" err="1">
+                <a:latin typeface="American Typewriter"/>
+                <a:cs typeface="American Typewriter"/>
+              </a:rPr>
+              <a:t>aimes</a:t>
+            </a:r>
+            <a:r>
+              <a:rPr lang="en-US" sz="2000" b="1" dirty="0">
+                <a:latin typeface="American Typewriter"/>
+                <a:cs typeface="American Typewriter"/>
+              </a:rPr>
+              <a:t>/skeleton/sample-input/</a:t>
+            </a:r>
+            <a:r>
+              <a:rPr lang="en-US" sz="2000" b="1" dirty="0" err="1" smtClean="0">
+                <a:latin typeface="American Typewriter"/>
+                <a:cs typeface="American Typewriter"/>
+              </a:rPr>
+              <a:t>bag.input</a:t>
+            </a:r>
+            <a:r>
+              <a:rPr lang="en-US" sz="2000" b="1" dirty="0" smtClean="0">
+                <a:latin typeface="American Typewriter"/>
+                <a:cs typeface="American Typewriter"/>
+              </a:rPr>
+              <a:t> –</a:t>
+            </a:r>
+            <a:r>
+              <a:rPr lang="en-US" sz="2000" b="1" dirty="0">
+                <a:latin typeface="American Typewriter"/>
+                <a:cs typeface="American Typewriter"/>
+              </a:rPr>
+              <a:t>m s</a:t>
+            </a:r>
+            <a:r>
+              <a:rPr lang="en-US" sz="2000" b="1" dirty="0" smtClean="0">
+                <a:latin typeface="American Typewriter"/>
+                <a:cs typeface="American Typewriter"/>
+              </a:rPr>
+              <a:t>hell </a:t>
+            </a:r>
+            <a:endParaRPr lang="en-US" sz="2000" b="1" dirty="0" smtClean="0">
               <a:latin typeface="American Typewriter"/>
               <a:cs typeface="American Typewriter"/>
             </a:endParaRPr>
-          </a:p>
-          <a:p>
-            <a:r>
-              <a:rPr lang="en-US" sz="2400" dirty="0" smtClean="0"/>
-              <a:t>Test case:</a:t>
-            </a:r>
-          </a:p>
-          <a:p>
-            <a:pPr lvl="1"/>
-            <a:r>
-              <a:rPr lang="en-US" sz="2000" b="1" dirty="0" smtClean="0">
-                <a:latin typeface="American Typewriter"/>
-                <a:cs typeface="American Typewriter"/>
-              </a:rPr>
-              <a:t>./</a:t>
-            </a:r>
-            <a:r>
-              <a:rPr lang="en-US" sz="2000" b="1" dirty="0" err="1" smtClean="0">
-                <a:latin typeface="American Typewriter"/>
-                <a:cs typeface="American Typewriter"/>
-              </a:rPr>
-              <a:t>skeleton.py</a:t>
-            </a:r>
-            <a:r>
-              <a:rPr lang="en-US" sz="2000" b="1" dirty="0" smtClean="0">
-                <a:latin typeface="American Typewriter"/>
-                <a:cs typeface="American Typewriter"/>
-              </a:rPr>
-              <a:t> sample-input/</a:t>
-            </a:r>
-            <a:r>
-              <a:rPr lang="en-US" sz="2000" b="1" dirty="0" err="1" smtClean="0">
-                <a:latin typeface="American Typewriter"/>
-                <a:cs typeface="American Typewriter"/>
-              </a:rPr>
-              <a:t>bag.input</a:t>
-            </a:r>
-            <a:r>
-              <a:rPr lang="en-US" sz="2000" b="1" dirty="0">
-                <a:latin typeface="American Typewriter"/>
-                <a:cs typeface="American Typewriter"/>
-              </a:rPr>
-              <a:t> </a:t>
-            </a:r>
-            <a:r>
-              <a:rPr lang="en-US" sz="2000" b="1" dirty="0" smtClean="0">
-                <a:latin typeface="American Typewriter"/>
-                <a:cs typeface="American Typewriter"/>
-              </a:rPr>
-              <a:t>Shell</a:t>
-            </a:r>
           </a:p>
           <a:p>
             <a:r>
@@ -13516,38 +13553,87 @@
           <a:p>
             <a:pPr lvl="1"/>
             <a:r>
+              <a:rPr lang="en-US" sz="2000" b="1" dirty="0">
+                <a:latin typeface="American Typewriter"/>
+                <a:cs typeface="American Typewriter"/>
+              </a:rPr>
+              <a:t>bin/</a:t>
+            </a:r>
+            <a:r>
+              <a:rPr lang="en-US" sz="2000" b="1" dirty="0" err="1">
+                <a:latin typeface="American Typewriter"/>
+                <a:cs typeface="American Typewriter"/>
+              </a:rPr>
+              <a:t>aimes</a:t>
+            </a:r>
+            <a:r>
+              <a:rPr lang="en-US" sz="2000" b="1" dirty="0">
+                <a:latin typeface="American Typewriter"/>
+                <a:cs typeface="American Typewriter"/>
+              </a:rPr>
+              <a:t>-skeleton-generate </a:t>
+            </a:r>
+            <a:r>
               <a:rPr lang="en-US" sz="2000" b="1" dirty="0" smtClean="0">
                 <a:latin typeface="American Typewriter"/>
                 <a:cs typeface="American Typewriter"/>
               </a:rPr>
-              <a:t>./</a:t>
+              <a:t>-</a:t>
             </a:r>
             <a:r>
               <a:rPr lang="en-US" sz="2000" b="1" dirty="0" err="1" smtClean="0">
                 <a:latin typeface="American Typewriter"/>
                 <a:cs typeface="American Typewriter"/>
               </a:rPr>
-              <a:t>skeleton.py</a:t>
+              <a:t>i</a:t>
             </a:r>
             <a:r>
               <a:rPr lang="en-US" sz="2000" b="1" dirty="0" smtClean="0">
                 <a:latin typeface="American Typewriter"/>
                 <a:cs typeface="American Typewriter"/>
               </a:rPr>
-              <a:t> sample-input/</a:t>
-            </a:r>
-            <a:r>
-              <a:rPr lang="en-US" sz="2000" b="1" dirty="0" err="1" smtClean="0">
+              <a:t> </a:t>
+            </a:r>
+            <a:r>
+              <a:rPr lang="en-US" sz="2000" b="1" dirty="0" err="1">
                 <a:latin typeface="American Typewriter"/>
                 <a:cs typeface="American Typewriter"/>
               </a:rPr>
-              <a:t>bag.input</a:t>
+              <a:t>src</a:t>
             </a:r>
             <a:r>
               <a:rPr lang="en-US" sz="2000" b="1" dirty="0">
                 <a:latin typeface="American Typewriter"/>
                 <a:cs typeface="American Typewriter"/>
               </a:rPr>
+              <a:t>/</a:t>
+            </a:r>
+            <a:r>
+              <a:rPr lang="en-US" sz="2000" b="1" dirty="0" err="1">
+                <a:latin typeface="American Typewriter"/>
+                <a:cs typeface="American Typewriter"/>
+              </a:rPr>
+              <a:t>aimes</a:t>
+            </a:r>
+            <a:r>
+              <a:rPr lang="en-US" sz="2000" b="1" dirty="0">
+                <a:latin typeface="American Typewriter"/>
+                <a:cs typeface="American Typewriter"/>
+              </a:rPr>
+              <a:t>/skeleton/sample-input/</a:t>
+            </a:r>
+            <a:r>
+              <a:rPr lang="en-US" sz="2000" b="1" dirty="0" err="1">
+                <a:latin typeface="American Typewriter"/>
+                <a:cs typeface="American Typewriter"/>
+              </a:rPr>
+              <a:t>bag.input</a:t>
+            </a:r>
+            <a:r>
+              <a:rPr lang="en-US" sz="2000" b="1" dirty="0">
+                <a:latin typeface="American Typewriter"/>
+                <a:cs typeface="American Typewriter"/>
+              </a:rPr>
               <a:t> </a:t>
             </a:r>
             <a:r>
@@ -13555,7 +13641,14 @@
                 <a:latin typeface="American Typewriter"/>
                 <a:cs typeface="American Typewriter"/>
               </a:rPr>
-              <a:t>Shell &gt; workflow	</a:t>
+              <a:t>-m shell -o workflow -c</a:t>
+            </a:r>
+            <a:r>
+              <a:rPr lang="en-US" sz="2000" b="1" dirty="0" smtClean="0">
+                <a:latin typeface="American Typewriter"/>
+                <a:cs typeface="American Typewriter"/>
+              </a:rPr>
+              <a:t>	</a:t>
             </a:r>
           </a:p>
           <a:p>
@@ -13571,15 +13664,33 @@
           <a:p>
             <a:pPr marL="742950" lvl="2" indent="-342900"/>
             <a:r>
+              <a:rPr lang="en-US" sz="2000" dirty="0">
+                <a:latin typeface="American Typewriter"/>
+                <a:cs typeface="American Typewriter"/>
+              </a:rPr>
+              <a:t>w</a:t>
+            </a:r>
+            <a:r>
+              <a:rPr lang="en-US" sz="2000" dirty="0" smtClean="0">
+                <a:latin typeface="American Typewriter"/>
+                <a:cs typeface="American Typewriter"/>
+              </a:rPr>
+              <a:t>orkflow-</a:t>
+            </a:r>
+            <a:r>
               <a:rPr lang="en-US" sz="2000" dirty="0" err="1" smtClean="0">
                 <a:latin typeface="American Typewriter"/>
                 <a:cs typeface="American Typewriter"/>
               </a:rPr>
-              <a:t>bag_Setup.sh</a:t>
+              <a:t>setup.sh</a:t>
             </a:r>
             <a:r>
               <a:rPr lang="en-US" sz="2000" dirty="0" smtClean="0"/>
-              <a:t> – </a:t>
+              <a:t> </a:t>
+            </a:r>
+            <a:r>
+              <a:rPr lang="en-US" sz="2000" dirty="0" smtClean="0"/>
+              <a:t>– </a:t>
             </a:r>
             <a:r>
               <a:rPr lang="en-US" sz="2000" dirty="0"/>
@@ -13605,11 +13716,22 @@
                 <a:latin typeface="American Typewriter"/>
                 <a:cs typeface="American Typewriter"/>
               </a:rPr>
-              <a:t>workflow</a:t>
+              <a:t>w</a:t>
+            </a:r>
+            <a:r>
+              <a:rPr lang="en-US" sz="2000" dirty="0" smtClean="0">
+                <a:latin typeface="American Typewriter"/>
+                <a:cs typeface="American Typewriter"/>
+              </a:rPr>
+              <a:t>orkflow</a:t>
+            </a:r>
+            <a:r>
+              <a:rPr lang="en-US" sz="2000" dirty="0" smtClean="0"/>
+              <a:t> </a:t>
             </a:r>
             <a:r>
               <a:rPr lang="en-US" sz="2000" dirty="0"/>
-              <a:t> – the script that can be executed to run the workflow</a:t>
+              <a:t>– the script that can be executed to run the workflow</a:t>
             </a:r>
           </a:p>
           <a:p>
@@ -14254,7 +14376,7 @@
         <p:spPr>
           <a:xfrm>
             <a:off x="212957" y="6358130"/>
-            <a:ext cx="8718236" cy="369332"/>
+            <a:ext cx="8718236" cy="338554"/>
           </a:xfrm>
           <a:prstGeom prst="rect">
             <a:avLst/>
@@ -14267,38 +14389,54 @@
           <a:lstStyle/>
           <a:p>
             <a:r>
-              <a:rPr lang="en-US" dirty="0"/>
+              <a:rPr lang="en-US" sz="1600" dirty="0"/>
               <a:t>https://</a:t>
             </a:r>
             <a:r>
-              <a:rPr lang="en-US" dirty="0" err="1"/>
+              <a:rPr lang="en-US" sz="1600" dirty="0" err="1"/>
               <a:t>github.com</a:t>
             </a:r>
             <a:r>
-              <a:rPr lang="en-US" dirty="0"/>
+              <a:rPr lang="en-US" sz="1600" dirty="0"/>
               <a:t>/</a:t>
             </a:r>
             <a:r>
-              <a:rPr lang="en-US" dirty="0" err="1"/>
+              <a:rPr lang="en-US" sz="1600" dirty="0" err="1"/>
               <a:t>applicationskeleton</a:t>
             </a:r>
             <a:r>
-              <a:rPr lang="en-US" dirty="0"/>
-              <a:t>/Skeleton/blob/master/</a:t>
-            </a:r>
-            <a:r>
-              <a:rPr lang="en-US" dirty="0" err="1"/>
+              <a:rPr lang="en-US" sz="1600" dirty="0"/>
+              <a:t>/Skeleton</a:t>
+            </a:r>
+            <a:r>
+              <a:rPr lang="en-US" sz="1600" dirty="0"/>
+              <a:t>/</a:t>
+            </a:r>
+            <a:r>
+              <a:rPr lang="en-US" sz="1600" dirty="0" err="1"/>
               <a:t>src</a:t>
             </a:r>
             <a:r>
-              <a:rPr lang="en-US" dirty="0"/>
-              <a:t>/sample-input/</a:t>
-            </a:r>
-            <a:r>
-              <a:rPr lang="en-US" dirty="0" err="1"/>
+              <a:rPr lang="en-US" sz="1600" dirty="0"/>
+              <a:t>/</a:t>
+            </a:r>
+            <a:r>
+              <a:rPr lang="en-US" sz="1600" dirty="0" err="1"/>
+              <a:t>aimes</a:t>
+            </a:r>
+            <a:r>
+              <a:rPr lang="en-US" sz="1600" dirty="0"/>
+              <a:t>/skeleton/sample-</a:t>
+            </a:r>
+            <a:r>
+              <a:rPr lang="en-US" sz="1600" dirty="0" smtClean="0"/>
+              <a:t>input/</a:t>
+            </a:r>
+            <a:r>
+              <a:rPr lang="en-US" sz="1600" dirty="0" err="1"/>
               <a:t>bag.input</a:t>
             </a:r>
-            <a:endParaRPr lang="en-US" dirty="0"/>
+            <a:endParaRPr lang="en-US" sz="1600" dirty="0"/>
           </a:p>
         </p:txBody>
       </p:sp>
@@ -15130,7 +15268,11 @@
           <a:p>
             <a:r>
               <a:rPr lang="en-US" dirty="0" smtClean="0"/>
-              <a:t>Bag of Task</a:t>
+              <a:t>Bag of </a:t>
+            </a:r>
+            <a:r>
+              <a:rPr lang="en-US" dirty="0" smtClean="0"/>
+              <a:t>Tasks</a:t>
             </a:r>
             <a:endParaRPr lang="en-US" dirty="0"/>
           </a:p>
@@ -15183,11 +15325,15 @@
             </a:r>
             <a:r>
               <a:rPr lang="en-US" dirty="0" err="1" smtClean="0"/>
-              <a:t>skeleton.py</a:t>
+              <a:t>aimes</a:t>
             </a:r>
             <a:r>
               <a:rPr lang="en-US" dirty="0" smtClean="0"/>
-              <a:t> (captured in workflow)</a:t>
+              <a:t>-skeleton-generate </a:t>
+            </a:r>
+            <a:r>
+              <a:rPr lang="en-US" dirty="0" smtClean="0"/>
+              <a:t>(captured in workflow)</a:t>
             </a:r>
           </a:p>
           <a:p>
@@ -15487,7 +15633,31 @@
             </a:r>
             <a:r>
               <a:rPr lang="en-US" sz="2000" dirty="0" smtClean="0"/>
-              <a:t> -o task </a:t>
+              <a:t> -o </a:t>
+            </a:r>
+            <a:r>
+              <a:rPr lang="en-US" sz="2000" dirty="0" smtClean="0"/>
+              <a:t>bin/task </a:t>
+            </a:r>
+            <a:r>
+              <a:rPr lang="en-US" sz="2000" dirty="0" err="1"/>
+              <a:t>src</a:t>
+            </a:r>
+            <a:r>
+              <a:rPr lang="en-US" sz="2000" dirty="0"/>
+              <a:t>/</a:t>
+            </a:r>
+            <a:r>
+              <a:rPr lang="en-US" sz="2000" dirty="0" err="1"/>
+              <a:t>aimes</a:t>
+            </a:r>
+            <a:r>
+              <a:rPr lang="en-US" sz="2000" dirty="0"/>
+              <a:t>/</a:t>
+            </a:r>
+            <a:r>
+              <a:rPr lang="en-US" sz="2000" dirty="0" smtClean="0"/>
+              <a:t>skeleton/</a:t>
             </a:r>
             <a:r>
               <a:rPr lang="en-US" sz="2000" dirty="0" err="1" smtClean="0"/>
@@ -15495,15 +15665,24 @@
             </a:r>
             <a:r>
               <a:rPr lang="en-US" sz="2000" dirty="0" smtClean="0"/>
-              <a:t> -lm</a:t>
+              <a:t> </a:t>
+            </a:r>
+            <a:r>
+              <a:rPr lang="en-US" sz="2000" dirty="0" smtClean="0"/>
+              <a:t>-lm</a:t>
             </a:r>
           </a:p>
           <a:p>
             <a:pPr marL="742950" lvl="2" indent="-342900"/>
             <a:r>
               <a:rPr lang="en-US" sz="2000" dirty="0" smtClean="0"/>
-              <a:t>export PATH=$PATH:$PWD</a:t>
-            </a:r>
+              <a:t>export PATH=$PATH:$</a:t>
+            </a:r>
+            <a:r>
+              <a:rPr lang="en-US" sz="2000" dirty="0" smtClean="0"/>
+              <a:t>PWD/bin</a:t>
+            </a:r>
+            <a:endParaRPr lang="en-US" sz="2000" dirty="0" smtClean="0"/>
           </a:p>
           <a:p>
             <a:pPr marL="342900" lvl="1" indent="-342900">
@@ -15528,7 +15707,7 @@
             </a:r>
             <a:r>
               <a:rPr lang="en-US" sz="2000" b="1" dirty="0" err="1" smtClean="0"/>
-              <a:t>bag_Setup.sh</a:t>
+              <a:t>workflow_setup.sh</a:t>
             </a:r>
             <a:endParaRPr lang="en-US" sz="2000" b="1" dirty="0" smtClean="0"/>
           </a:p>
@@ -15636,7 +15815,7 @@
         <p:spPr/>
         <p:txBody>
           <a:bodyPr>
-            <a:normAutofit fontScale="70000" lnSpcReduction="20000"/>
+            <a:normAutofit fontScale="62500" lnSpcReduction="20000"/>
           </a:bodyPr>
           <a:lstStyle/>
           <a:p>
@@ -15656,53 +15835,95 @@
           <a:p>
             <a:pPr lvl="1"/>
             <a:r>
-              <a:rPr lang="en-US" sz="2000" b="1" dirty="0" smtClean="0">
-                <a:latin typeface="American Typewriter"/>
-                <a:cs typeface="American Typewriter"/>
-              </a:rPr>
-              <a:t>./</a:t>
-            </a:r>
-            <a:r>
-              <a:rPr lang="en-US" sz="2000" b="1" dirty="0" err="1" smtClean="0">
-                <a:latin typeface="American Typewriter"/>
-                <a:cs typeface="American Typewriter"/>
-              </a:rPr>
-              <a:t>skeleton.py</a:t>
-            </a:r>
-            <a:r>
-              <a:rPr lang="en-US" sz="2000" b="1" dirty="0" smtClean="0">
-                <a:latin typeface="American Typewriter"/>
-                <a:cs typeface="American Typewriter"/>
-              </a:rPr>
-              <a:t> sample-input/</a:t>
-            </a:r>
-            <a:r>
-              <a:rPr lang="en-US" sz="2000" b="1" dirty="0" err="1" smtClean="0">
-                <a:latin typeface="American Typewriter"/>
-                <a:cs typeface="American Typewriter"/>
-              </a:rPr>
-              <a:t>bag.input</a:t>
-            </a:r>
-            <a:r>
               <a:rPr lang="en-US" sz="2000" b="1" dirty="0">
                 <a:latin typeface="American Typewriter"/>
                 <a:cs typeface="American Typewriter"/>
               </a:rPr>
-              <a:t> </a:t>
-            </a:r>
-            <a:r>
-              <a:rPr lang="en-US" sz="2000" b="1" dirty="0" smtClean="0">
+              <a:t>bin/</a:t>
+            </a:r>
+            <a:r>
+              <a:rPr lang="en-US" sz="2000" b="1" dirty="0" err="1">
                 <a:latin typeface="American Typewriter"/>
                 <a:cs typeface="American Typewriter"/>
               </a:rPr>
-              <a:t>Swift &gt; </a:t>
-            </a:r>
-            <a:r>
-              <a:rPr lang="en-US" sz="2000" b="1" dirty="0" err="1" smtClean="0">
+              <a:t>aimes</a:t>
+            </a:r>
+            <a:r>
+              <a:rPr lang="en-US" sz="2000" b="1" dirty="0">
                 <a:latin typeface="American Typewriter"/>
                 <a:cs typeface="American Typewriter"/>
               </a:rPr>
+              <a:t>-skeleton-generate -</a:t>
+            </a:r>
+            <a:r>
+              <a:rPr lang="en-US" sz="2000" b="1" dirty="0" err="1">
+                <a:latin typeface="American Typewriter"/>
+                <a:cs typeface="American Typewriter"/>
+              </a:rPr>
+              <a:t>i</a:t>
+            </a:r>
+            <a:r>
+              <a:rPr lang="en-US" sz="2000" b="1" dirty="0">
+                <a:latin typeface="American Typewriter"/>
+                <a:cs typeface="American Typewriter"/>
+              </a:rPr>
+              <a:t> </a:t>
+            </a:r>
+            <a:r>
+              <a:rPr lang="en-US" sz="2000" b="1" dirty="0" err="1">
+                <a:latin typeface="American Typewriter"/>
+                <a:cs typeface="American Typewriter"/>
+              </a:rPr>
+              <a:t>src</a:t>
+            </a:r>
+            <a:r>
+              <a:rPr lang="en-US" sz="2000" b="1" dirty="0">
+                <a:latin typeface="American Typewriter"/>
+                <a:cs typeface="American Typewriter"/>
+              </a:rPr>
+              <a:t>/</a:t>
+            </a:r>
+            <a:r>
+              <a:rPr lang="en-US" sz="2000" b="1" dirty="0" err="1">
+                <a:latin typeface="American Typewriter"/>
+                <a:cs typeface="American Typewriter"/>
+              </a:rPr>
+              <a:t>aimes</a:t>
+            </a:r>
+            <a:r>
+              <a:rPr lang="en-US" sz="2000" b="1" dirty="0">
+                <a:latin typeface="American Typewriter"/>
+                <a:cs typeface="American Typewriter"/>
+              </a:rPr>
+              <a:t>/skeleton/sample-input/</a:t>
+            </a:r>
+            <a:r>
+              <a:rPr lang="en-US" sz="2000" b="1" dirty="0" err="1">
+                <a:latin typeface="American Typewriter"/>
+                <a:cs typeface="American Typewriter"/>
+              </a:rPr>
+              <a:t>bag.input</a:t>
+            </a:r>
+            <a:r>
+              <a:rPr lang="en-US" sz="2000" b="1" dirty="0">
+                <a:latin typeface="American Typewriter"/>
+                <a:cs typeface="American Typewriter"/>
+              </a:rPr>
+              <a:t> -m swift -o </a:t>
+            </a:r>
+            <a:r>
+              <a:rPr lang="en-US" sz="2000" b="1" dirty="0" err="1">
+                <a:latin typeface="American Typewriter"/>
+                <a:cs typeface="American Typewriter"/>
+              </a:rPr>
               <a:t>workflow.swift</a:t>
+            </a:r>
+            <a:r>
+              <a:rPr lang="en-US" sz="2000" b="1" dirty="0">
+                <a:latin typeface="American Typewriter"/>
+                <a:cs typeface="American Typewriter"/>
+              </a:rPr>
+              <a:t> -c</a:t>
             </a:r>
             <a:r>
               <a:rPr lang="en-US" sz="2000" b="1" dirty="0" smtClean="0">
@@ -15725,70 +15946,38 @@
           <a:p>
             <a:pPr marL="742950" lvl="2" indent="-342900"/>
             <a:r>
+              <a:rPr lang="en-US" sz="2000" dirty="0" err="1">
+                <a:latin typeface="American Typewriter"/>
+                <a:cs typeface="American Typewriter"/>
+              </a:rPr>
+              <a:t>w</a:t>
+            </a:r>
+            <a:r>
               <a:rPr lang="en-US" sz="2000" dirty="0" err="1" smtClean="0">
                 <a:latin typeface="American Typewriter"/>
                 <a:cs typeface="American Typewriter"/>
               </a:rPr>
-              <a:t>bag_Setup.sh</a:t>
+              <a:t>orkflow_setup.sh</a:t>
             </a:r>
             <a:r>
               <a:rPr lang="en-US" sz="2000" dirty="0" smtClean="0"/>
-              <a:t> – </a:t>
-            </a:r>
-            <a:r>
-              <a:rPr lang="en-US" sz="2000" dirty="0"/>
-              <a:t>the script that </a:t>
-            </a:r>
-            <a:r>
-              <a:rPr lang="en-US" sz="2000" dirty="0" smtClean="0"/>
-              <a:t>creates the </a:t>
-            </a:r>
-            <a:r>
-              <a:rPr lang="en-US" sz="2000" dirty="0"/>
-              <a:t>input and output directories</a:t>
-            </a:r>
-            <a:r>
-              <a:rPr lang="en-US" sz="2000" dirty="0" smtClean="0"/>
-              <a:t> for the tasks, and creates the initial input files</a:t>
+              <a:t> – the script that creates the input and output directories for the tasks, and creates the initial input files</a:t>
             </a:r>
           </a:p>
           <a:p>
             <a:pPr marL="742950" lvl="2" indent="-342900"/>
-            <a:r>
-              <a:rPr lang="en-US" sz="2000" dirty="0" err="1">
-                <a:latin typeface="American Typewriter"/>
-                <a:cs typeface="American Typewriter"/>
-              </a:rPr>
-              <a:t>w</a:t>
-            </a:r>
             <a:r>
               <a:rPr lang="en-US" sz="2000" dirty="0" err="1" smtClean="0">
                 <a:latin typeface="American Typewriter"/>
                 <a:cs typeface="American Typewriter"/>
               </a:rPr>
-              <a:t>orkflow.swift</a:t>
+              <a:t>workflow.swift</a:t>
             </a:r>
             <a:r>
               <a:rPr lang="en-US" sz="2000" dirty="0" smtClean="0"/>
-              <a:t> </a:t>
-            </a:r>
-            <a:r>
-              <a:rPr lang="en-US" sz="2000" dirty="0"/>
-              <a:t>– the </a:t>
-            </a:r>
-            <a:r>
-              <a:rPr lang="en-US" sz="2000" dirty="0" smtClean="0"/>
-              <a:t>Swift script </a:t>
-            </a:r>
-            <a:r>
-              <a:rPr lang="en-US" sz="2000" dirty="0"/>
-              <a:t>that can be executed to run the </a:t>
-            </a:r>
-            <a:r>
-              <a:rPr lang="en-US" sz="2000" dirty="0" smtClean="0"/>
-              <a:t>workflow</a:t>
-            </a:r>
-            <a:endParaRPr lang="en-US" sz="2600" dirty="0"/>
+              <a:t> – the Swift script that can be executed to run the workflow</a:t>
+            </a:r>
+            <a:endParaRPr lang="en-US" sz="2600" dirty="0" smtClean="0"/>
           </a:p>
           <a:p>
             <a:pPr marL="342900" lvl="1" indent="-342900">
@@ -15797,58 +15986,53 @@
             </a:pPr>
             <a:r>
               <a:rPr lang="en-US" sz="2400" dirty="0" smtClean="0"/>
-              <a:t>To </a:t>
-            </a:r>
-            <a:r>
-              <a:rPr lang="en-US" sz="2400" dirty="0"/>
-              <a:t>s</a:t>
-            </a:r>
-            <a:r>
-              <a:rPr lang="en-US" sz="2400" dirty="0" smtClean="0"/>
-              <a:t>etup Swift:</a:t>
+              <a:t>To setup Swift:</a:t>
             </a:r>
           </a:p>
           <a:p>
             <a:pPr marL="742950" lvl="2" indent="-342900"/>
             <a:r>
+              <a:rPr lang="en-US" sz="2000" dirty="0" smtClean="0"/>
+              <a:t>Install Swift: http://swift-</a:t>
+            </a:r>
+            <a:r>
+              <a:rPr lang="en-US" sz="2000" dirty="0" err="1" smtClean="0"/>
+              <a:t>lang.org</a:t>
+            </a:r>
+            <a:r>
+              <a:rPr lang="en-US" sz="2000" dirty="0" smtClean="0"/>
+              <a:t>/guides/release-0.94/</a:t>
+            </a:r>
+            <a:r>
+              <a:rPr lang="en-US" sz="2000" dirty="0" err="1" smtClean="0"/>
+              <a:t>quickstart</a:t>
+            </a:r>
+            <a:r>
+              <a:rPr lang="en-US" sz="2000" dirty="0" smtClean="0"/>
+              <a:t>/</a:t>
+            </a:r>
+            <a:r>
+              <a:rPr lang="en-US" sz="2000" dirty="0" err="1" smtClean="0"/>
+              <a:t>quickstart.html</a:t>
+            </a:r>
+            <a:endParaRPr lang="en-US" sz="2000" dirty="0" smtClean="0"/>
+          </a:p>
+          <a:p>
+            <a:pPr marL="742950" lvl="2" indent="-342900"/>
+            <a:r>
               <a:rPr lang="en-US" sz="2000" dirty="0"/>
-              <a:t>Install Swift: http://swift-</a:t>
-            </a:r>
-            <a:r>
-              <a:rPr lang="en-US" sz="2000" dirty="0" err="1"/>
-              <a:t>lang.org</a:t>
-            </a:r>
-            <a:r>
-              <a:rPr lang="en-US" sz="2000" dirty="0"/>
-              <a:t>/guides/release-0.94/</a:t>
-            </a:r>
-            <a:r>
-              <a:rPr lang="en-US" sz="2000" dirty="0" err="1"/>
-              <a:t>quickstart</a:t>
-            </a:r>
-            <a:r>
-              <a:rPr lang="en-US" sz="2000" dirty="0"/>
-              <a:t>/</a:t>
-            </a:r>
-            <a:r>
-              <a:rPr lang="en-US" sz="2000" dirty="0" err="1"/>
-              <a:t>quickstart.html</a:t>
-            </a:r>
-            <a:endParaRPr lang="en-US" sz="2000" dirty="0" smtClean="0"/>
+              <a:t>export PATH=$PATH:$PWD/bin</a:t>
+            </a:r>
           </a:p>
           <a:p>
             <a:pPr marL="742950" lvl="2" indent="-342900"/>
-            <a:r>
-              <a:rPr lang="en-US" sz="2000" dirty="0" smtClean="0"/>
-              <a:t>../</a:t>
-            </a:r>
             <a:r>
               <a:rPr lang="en-US" sz="2000" dirty="0" err="1" smtClean="0"/>
               <a:t>util</a:t>
             </a:r>
             <a:r>
               <a:rPr lang="en-US" sz="2000" dirty="0" smtClean="0"/>
-              <a:t>/gent-</a:t>
+              <a:t>/gen-</a:t>
             </a:r>
             <a:r>
               <a:rPr lang="en-US" sz="2000" dirty="0" err="1" smtClean="0"/>
@@ -15879,7 +16063,11 @@
             </a:pPr>
             <a:r>
               <a:rPr lang="en-US" sz="2400" dirty="0" smtClean="0"/>
-              <a:t>To run:</a:t>
+              <a:t>To </a:t>
+            </a:r>
+            <a:r>
+              <a:rPr lang="en-US" sz="2400" dirty="0" smtClean="0"/>
+              <a:t>run:</a:t>
             </a:r>
           </a:p>
           <a:p>
@@ -15890,7 +16078,23 @@
             </a:r>
             <a:r>
               <a:rPr lang="en-US" sz="2000" b="1" dirty="0"/>
-              <a:t> –o task </a:t>
+              <a:t> -o bin/task </a:t>
+            </a:r>
+            <a:r>
+              <a:rPr lang="en-US" sz="2000" b="1" dirty="0" err="1"/>
+              <a:t>src</a:t>
+            </a:r>
+            <a:r>
+              <a:rPr lang="en-US" sz="2000" b="1" dirty="0"/>
+              <a:t>/</a:t>
+            </a:r>
+            <a:r>
+              <a:rPr lang="en-US" sz="2000" b="1" dirty="0" err="1"/>
+              <a:t>aimes</a:t>
+            </a:r>
+            <a:r>
+              <a:rPr lang="en-US" sz="2000" b="1" dirty="0"/>
+              <a:t>/skeleton/</a:t>
             </a:r>
             <a:r>
               <a:rPr lang="en-US" sz="2000" b="1" dirty="0" err="1"/>
@@ -15902,15 +16106,19 @@
             </a:r>
             <a:r>
               <a:rPr lang="en-US" sz="2000" b="1" dirty="0" smtClean="0"/>
-              <a:t>–lm</a:t>
+              <a:t>-lm</a:t>
             </a:r>
             <a:endParaRPr lang="en-US" sz="2000" b="1" dirty="0"/>
           </a:p>
           <a:p>
             <a:pPr marL="742950" lvl="2" indent="-342900"/>
             <a:r>
+              <a:rPr lang="en-US" sz="2000" b="1" dirty="0" err="1"/>
+              <a:t>s</a:t>
+            </a:r>
+            <a:r>
               <a:rPr lang="en-US" sz="2000" b="1" dirty="0" err="1" smtClean="0"/>
-              <a:t>sh</a:t>
+              <a:t>h</a:t>
             </a:r>
             <a:r>
               <a:rPr lang="en-US" sz="2000" b="1" dirty="0" smtClean="0"/>
@@ -15918,15 +16126,23 @@
             </a:r>
             <a:r>
               <a:rPr lang="en-US" sz="2000" b="1" dirty="0" err="1" smtClean="0"/>
-              <a:t>bag_Setup.sh</a:t>
+              <a:t>worklow_s</a:t>
+            </a:r>
+            <a:r>
+              <a:rPr lang="en-US" sz="2000" b="1" dirty="0" err="1" smtClean="0"/>
+              <a:t>etup.sh</a:t>
             </a:r>
             <a:endParaRPr lang="en-US" sz="2000" b="1" dirty="0" smtClean="0"/>
           </a:p>
           <a:p>
             <a:pPr marL="742950" lvl="2" indent="-342900"/>
             <a:r>
+              <a:rPr lang="en-US" sz="2000" b="1" dirty="0"/>
+              <a:t>s</a:t>
+            </a:r>
+            <a:r>
               <a:rPr lang="en-US" sz="2000" b="1" dirty="0" smtClean="0"/>
-              <a:t>swift –</a:t>
+              <a:t>wift -</a:t>
             </a:r>
             <a:r>
               <a:rPr lang="en-US" sz="2000" b="1" dirty="0" err="1" smtClean="0"/>
@@ -16165,53 +16381,123 @@
           <a:p>
             <a:pPr lvl="1"/>
             <a:r>
+              <a:rPr lang="en-US" sz="2000" b="1" dirty="0">
+                <a:latin typeface="American Typewriter"/>
+                <a:cs typeface="American Typewriter"/>
+              </a:rPr>
+              <a:t>bin/</a:t>
+            </a:r>
+            <a:r>
+              <a:rPr lang="en-US" sz="2000" b="1" dirty="0" err="1">
+                <a:latin typeface="American Typewriter"/>
+                <a:cs typeface="American Typewriter"/>
+              </a:rPr>
+              <a:t>aimes</a:t>
+            </a:r>
+            <a:r>
+              <a:rPr lang="en-US" sz="2000" b="1" dirty="0">
+                <a:latin typeface="American Typewriter"/>
+                <a:cs typeface="American Typewriter"/>
+              </a:rPr>
+              <a:t>-skeleton-generate -</a:t>
+            </a:r>
+            <a:r>
+              <a:rPr lang="en-US" sz="2000" b="1" dirty="0" err="1">
+                <a:latin typeface="American Typewriter"/>
+                <a:cs typeface="American Typewriter"/>
+              </a:rPr>
+              <a:t>i</a:t>
+            </a:r>
+            <a:r>
+              <a:rPr lang="en-US" sz="2000" b="1" dirty="0">
+                <a:latin typeface="American Typewriter"/>
+                <a:cs typeface="American Typewriter"/>
+              </a:rPr>
+              <a:t> </a:t>
+            </a:r>
+            <a:r>
+              <a:rPr lang="en-US" sz="2000" b="1" dirty="0" err="1">
+                <a:latin typeface="American Typewriter"/>
+                <a:cs typeface="American Typewriter"/>
+              </a:rPr>
+              <a:t>src</a:t>
+            </a:r>
+            <a:r>
+              <a:rPr lang="en-US" sz="2000" b="1" dirty="0">
+                <a:latin typeface="American Typewriter"/>
+                <a:cs typeface="American Typewriter"/>
+              </a:rPr>
+              <a:t>/</a:t>
+            </a:r>
+            <a:r>
+              <a:rPr lang="en-US" sz="2000" b="1" dirty="0" err="1">
+                <a:latin typeface="American Typewriter"/>
+                <a:cs typeface="American Typewriter"/>
+              </a:rPr>
+              <a:t>aimes</a:t>
+            </a:r>
+            <a:r>
+              <a:rPr lang="en-US" sz="2000" b="1" dirty="0">
+                <a:latin typeface="American Typewriter"/>
+                <a:cs typeface="American Typewriter"/>
+              </a:rPr>
+              <a:t>/skeleton/sample-input/</a:t>
+            </a:r>
+            <a:r>
+              <a:rPr lang="en-US" sz="2000" b="1" dirty="0" err="1">
+                <a:latin typeface="American Typewriter"/>
+                <a:cs typeface="American Typewriter"/>
+              </a:rPr>
+              <a:t>bag.input</a:t>
+            </a:r>
+            <a:r>
+              <a:rPr lang="en-US" sz="2000" b="1" dirty="0">
+                <a:latin typeface="American Typewriter"/>
+                <a:cs typeface="American Typewriter"/>
+              </a:rPr>
+              <a:t> -m </a:t>
+            </a:r>
+            <a:r>
+              <a:rPr lang="en-US" sz="2000" b="1" dirty="0" err="1" smtClean="0">
+                <a:latin typeface="American Typewriter"/>
+                <a:cs typeface="American Typewriter"/>
+              </a:rPr>
+              <a:t>pegasus</a:t>
+            </a:r>
+            <a:r>
               <a:rPr lang="en-US" sz="2000" b="1" dirty="0" smtClean="0">
                 <a:latin typeface="American Typewriter"/>
                 <a:cs typeface="American Typewriter"/>
               </a:rPr>
-              <a:t>./</a:t>
+              <a:t> -</a:t>
+            </a:r>
+            <a:r>
+              <a:rPr lang="en-US" sz="2000" b="1" dirty="0">
+                <a:latin typeface="American Typewriter"/>
+                <a:cs typeface="American Typewriter"/>
+              </a:rPr>
+              <a:t>o </a:t>
             </a:r>
             <a:r>
               <a:rPr lang="en-US" sz="2000" b="1" dirty="0" err="1" smtClean="0">
                 <a:latin typeface="American Typewriter"/>
                 <a:cs typeface="American Typewriter"/>
               </a:rPr>
-              <a:t>skeleton.py</a:t>
+              <a:t>workflow.dax</a:t>
             </a:r>
             <a:r>
               <a:rPr lang="en-US" sz="2000" b="1" dirty="0" smtClean="0">
                 <a:latin typeface="American Typewriter"/>
                 <a:cs typeface="American Typewriter"/>
               </a:rPr>
-              <a:t> sample-input/</a:t>
-            </a:r>
-            <a:r>
-              <a:rPr lang="en-US" sz="2000" b="1" dirty="0" err="1" smtClean="0">
-                <a:latin typeface="American Typewriter"/>
-                <a:cs typeface="American Typewriter"/>
-              </a:rPr>
-              <a:t>bag.input</a:t>
+              <a:t> </a:t>
             </a:r>
             <a:r>
               <a:rPr lang="en-US" sz="2000" b="1" dirty="0">
                 <a:latin typeface="American Typewriter"/>
                 <a:cs typeface="American Typewriter"/>
               </a:rPr>
-              <a:t> </a:t>
-            </a:r>
-            <a:r>
-              <a:rPr lang="en-US" sz="2000" b="1" dirty="0" smtClean="0">
-                <a:latin typeface="American Typewriter"/>
-                <a:cs typeface="American Typewriter"/>
-              </a:rPr>
-              <a:t>Pegasus &gt; </a:t>
-            </a:r>
-            <a:r>
-              <a:rPr lang="en-US" sz="2000" b="1" dirty="0" err="1" smtClean="0">
-                <a:latin typeface="American Typewriter"/>
-                <a:cs typeface="American Typewriter"/>
-              </a:rPr>
-              <a:t>workflow.dax</a:t>
+              <a:t>-c</a:t>
             </a:r>
             <a:r>
               <a:rPr lang="en-US" sz="2000" b="1" dirty="0" smtClean="0">
@@ -16234,15 +16520,26 @@
           <a:p>
             <a:pPr marL="742950" lvl="2" indent="-342900"/>
             <a:r>
+              <a:rPr lang="en-US" sz="2000" dirty="0" err="1">
+                <a:latin typeface="American Typewriter"/>
+                <a:cs typeface="American Typewriter"/>
+              </a:rPr>
+              <a:t>w</a:t>
+            </a:r>
+            <a:r>
               <a:rPr lang="en-US" sz="2000" dirty="0" err="1" smtClean="0">
                 <a:latin typeface="American Typewriter"/>
                 <a:cs typeface="American Typewriter"/>
               </a:rPr>
-              <a:t>bag_Setup.sh</a:t>
+              <a:t>orkflow_setup.sh</a:t>
             </a:r>
             <a:r>
               <a:rPr lang="en-US" sz="2000" dirty="0" smtClean="0"/>
-              <a:t> – </a:t>
+              <a:t> </a:t>
+            </a:r>
+            <a:r>
+              <a:rPr lang="en-US" sz="2000" dirty="0" smtClean="0"/>
+              <a:t>– </a:t>
             </a:r>
             <a:r>
               <a:rPr lang="en-US" sz="2000" dirty="0"/>
@@ -16316,7 +16613,11 @@
             </a:r>
             <a:r>
               <a:rPr lang="en-US" sz="2000" b="1" dirty="0" err="1" smtClean="0"/>
-              <a:t>bag_Setup.sh</a:t>
+              <a:t>workflow_s</a:t>
+            </a:r>
+            <a:r>
+              <a:rPr lang="en-US" sz="2000" b="1" dirty="0" err="1" smtClean="0"/>
+              <a:t>etup.sh</a:t>
             </a:r>
             <a:endParaRPr lang="en-US" sz="2000" b="1" dirty="0" smtClean="0"/>
           </a:p>

</xml_diff>